<commit_message>
Fixed wrong unit conversion
</commit_message>
<xml_diff>
--- a/docs/report.pptx
+++ b/docs/report.pptx
@@ -2,7 +2,7 @@
 <file path=ppt/presentation.xml><?xml version="1.0" encoding="utf-8"?>
 <p:presentation xmlns:a="http://schemas.openxmlformats.org/drawingml/2006/main" xmlns:r="http://schemas.openxmlformats.org/officeDocument/2006/relationships" xmlns:p="http://schemas.openxmlformats.org/presentationml/2006/main" saveSubsetFonts="1">
   <p:sldMasterIdLst>
-    <p:sldMasterId id="2147483923" r:id="rId1"/>
+    <p:sldMasterId id="2147483959" r:id="rId1"/>
   </p:sldMasterIdLst>
   <p:sldIdLst>
     <p:sldId id="256" r:id="rId2"/>
@@ -23,7 +23,7 @@
     <a:defPPr>
       <a:defRPr lang="en-US"/>
     </a:defPPr>
-    <a:lvl1pPr marL="0" algn="l" defTabSz="914400" rtl="0" eaLnBrk="1" latinLnBrk="0" hangingPunct="1">
+    <a:lvl1pPr marL="0" algn="l" defTabSz="457200" rtl="0" eaLnBrk="1" latinLnBrk="0" hangingPunct="1">
       <a:defRPr sz="1800" kern="1200">
         <a:solidFill>
           <a:schemeClr val="tx1"/>
@@ -33,7 +33,7 @@
         <a:cs typeface="+mn-cs"/>
       </a:defRPr>
     </a:lvl1pPr>
-    <a:lvl2pPr marL="457200" algn="l" defTabSz="914400" rtl="0" eaLnBrk="1" latinLnBrk="0" hangingPunct="1">
+    <a:lvl2pPr marL="457200" algn="l" defTabSz="457200" rtl="0" eaLnBrk="1" latinLnBrk="0" hangingPunct="1">
       <a:defRPr sz="1800" kern="1200">
         <a:solidFill>
           <a:schemeClr val="tx1"/>
@@ -43,7 +43,7 @@
         <a:cs typeface="+mn-cs"/>
       </a:defRPr>
     </a:lvl2pPr>
-    <a:lvl3pPr marL="914400" algn="l" defTabSz="914400" rtl="0" eaLnBrk="1" latinLnBrk="0" hangingPunct="1">
+    <a:lvl3pPr marL="914400" algn="l" defTabSz="457200" rtl="0" eaLnBrk="1" latinLnBrk="0" hangingPunct="1">
       <a:defRPr sz="1800" kern="1200">
         <a:solidFill>
           <a:schemeClr val="tx1"/>
@@ -53,7 +53,7 @@
         <a:cs typeface="+mn-cs"/>
       </a:defRPr>
     </a:lvl3pPr>
-    <a:lvl4pPr marL="1371600" algn="l" defTabSz="914400" rtl="0" eaLnBrk="1" latinLnBrk="0" hangingPunct="1">
+    <a:lvl4pPr marL="1371600" algn="l" defTabSz="457200" rtl="0" eaLnBrk="1" latinLnBrk="0" hangingPunct="1">
       <a:defRPr sz="1800" kern="1200">
         <a:solidFill>
           <a:schemeClr val="tx1"/>
@@ -63,7 +63,7 @@
         <a:cs typeface="+mn-cs"/>
       </a:defRPr>
     </a:lvl4pPr>
-    <a:lvl5pPr marL="1828800" algn="l" defTabSz="914400" rtl="0" eaLnBrk="1" latinLnBrk="0" hangingPunct="1">
+    <a:lvl5pPr marL="1828800" algn="l" defTabSz="457200" rtl="0" eaLnBrk="1" latinLnBrk="0" hangingPunct="1">
       <a:defRPr sz="1800" kern="1200">
         <a:solidFill>
           <a:schemeClr val="tx1"/>
@@ -73,7 +73,7 @@
         <a:cs typeface="+mn-cs"/>
       </a:defRPr>
     </a:lvl5pPr>
-    <a:lvl6pPr marL="2286000" algn="l" defTabSz="914400" rtl="0" eaLnBrk="1" latinLnBrk="0" hangingPunct="1">
+    <a:lvl6pPr marL="2286000" algn="l" defTabSz="457200" rtl="0" eaLnBrk="1" latinLnBrk="0" hangingPunct="1">
       <a:defRPr sz="1800" kern="1200">
         <a:solidFill>
           <a:schemeClr val="tx1"/>
@@ -83,7 +83,7 @@
         <a:cs typeface="+mn-cs"/>
       </a:defRPr>
     </a:lvl6pPr>
-    <a:lvl7pPr marL="2743200" algn="l" defTabSz="914400" rtl="0" eaLnBrk="1" latinLnBrk="0" hangingPunct="1">
+    <a:lvl7pPr marL="2743200" algn="l" defTabSz="457200" rtl="0" eaLnBrk="1" latinLnBrk="0" hangingPunct="1">
       <a:defRPr sz="1800" kern="1200">
         <a:solidFill>
           <a:schemeClr val="tx1"/>
@@ -93,7 +93,7 @@
         <a:cs typeface="+mn-cs"/>
       </a:defRPr>
     </a:lvl7pPr>
-    <a:lvl8pPr marL="3200400" algn="l" defTabSz="914400" rtl="0" eaLnBrk="1" latinLnBrk="0" hangingPunct="1">
+    <a:lvl8pPr marL="3200400" algn="l" defTabSz="457200" rtl="0" eaLnBrk="1" latinLnBrk="0" hangingPunct="1">
       <a:defRPr sz="1800" kern="1200">
         <a:solidFill>
           <a:schemeClr val="tx1"/>
@@ -103,7 +103,7 @@
         <a:cs typeface="+mn-cs"/>
       </a:defRPr>
     </a:lvl8pPr>
-    <a:lvl9pPr marL="3657600" algn="l" defTabSz="914400" rtl="0" eaLnBrk="1" latinLnBrk="0" hangingPunct="1">
+    <a:lvl9pPr marL="3657600" algn="l" defTabSz="457200" rtl="0" eaLnBrk="1" latinLnBrk="0" hangingPunct="1">
       <a:defRPr sz="1800" kern="1200">
         <a:solidFill>
           <a:schemeClr val="tx1"/>
@@ -127,12 +127,12 @@
   <pc:docChgLst>
     <pc:chgData name="Mansur He" userId="2cd3e99d6a3c3959" providerId="LiveId" clId="{16CB9BD3-0FD0-435F-BA63-C692E6031789}"/>
     <pc:docChg chg="undo custSel addSld modSld sldOrd modMainMaster">
-      <pc:chgData name="Mansur He" userId="2cd3e99d6a3c3959" providerId="LiveId" clId="{16CB9BD3-0FD0-435F-BA63-C692E6031789}" dt="2017-11-16T19:40:31.918" v="1818" actId="1076"/>
+      <pc:chgData name="Mansur He" userId="2cd3e99d6a3c3959" providerId="LiveId" clId="{16CB9BD3-0FD0-435F-BA63-C692E6031789}" dt="2017-11-16T22:44:21.798" v="1893" actId="11529"/>
       <pc:docMkLst>
         <pc:docMk/>
       </pc:docMkLst>
       <pc:sldChg chg="addSp delSp modSp">
-        <pc:chgData name="Mansur He" userId="2cd3e99d6a3c3959" providerId="LiveId" clId="{16CB9BD3-0FD0-435F-BA63-C692E6031789}" dt="2017-11-15T19:17:30.237" v="1381" actId="1076"/>
+        <pc:chgData name="Mansur He" userId="2cd3e99d6a3c3959" providerId="LiveId" clId="{16CB9BD3-0FD0-435F-BA63-C692E6031789}" dt="2017-11-16T22:36:02.488" v="1888"/>
         <pc:sldMkLst>
           <pc:docMk/>
           <pc:sldMk cId="776887676" sldId="256"/>
@@ -185,6 +185,14 @@
             <ac:spMk id="8" creationId="{DB4CF1C3-0A16-43FC-B8BD-1CD81E32411E}"/>
           </ac:spMkLst>
         </pc:spChg>
+        <pc:picChg chg="add mod ord">
+          <ac:chgData name="Mansur He" userId="2cd3e99d6a3c3959" providerId="LiveId" clId="{16CB9BD3-0FD0-435F-BA63-C692E6031789}" dt="2017-11-16T22:36:02.488" v="1888"/>
+          <ac:picMkLst>
+            <pc:docMk/>
+            <pc:sldMk cId="776887676" sldId="256"/>
+            <ac:picMk id="3" creationId="{56E381CE-93BF-4CDB-B83C-F1D427444DA4}"/>
+          </ac:picMkLst>
+        </pc:picChg>
       </pc:sldChg>
       <pc:sldChg chg="addSp delSp modSp">
         <pc:chgData name="Mansur He" userId="2cd3e99d6a3c3959" providerId="LiveId" clId="{16CB9BD3-0FD0-435F-BA63-C692E6031789}" dt="2017-11-15T21:55:29.793" v="1761" actId="1076"/>
@@ -918,7 +926,7 @@
         </pc:cxnChg>
       </pc:sldChg>
       <pc:sldChg chg="addSp delSp modSp add">
-        <pc:chgData name="Mansur He" userId="2cd3e99d6a3c3959" providerId="LiveId" clId="{16CB9BD3-0FD0-435F-BA63-C692E6031789}" dt="2017-11-15T19:23:17.861" v="1618" actId="1076"/>
+        <pc:chgData name="Mansur He" userId="2cd3e99d6a3c3959" providerId="LiveId" clId="{16CB9BD3-0FD0-435F-BA63-C692E6031789}" dt="2017-11-16T22:44:21.798" v="1893" actId="11529"/>
         <pc:sldMkLst>
           <pc:docMk/>
           <pc:sldMk cId="1495167305" sldId="267"/>
@@ -940,6 +948,14 @@
           </ac:spMkLst>
         </pc:spChg>
         <pc:spChg chg="add mod">
+          <ac:chgData name="Mansur He" userId="2cd3e99d6a3c3959" providerId="LiveId" clId="{16CB9BD3-0FD0-435F-BA63-C692E6031789}" dt="2017-11-16T22:44:00.379" v="1890" actId="1076"/>
+          <ac:spMkLst>
+            <pc:docMk/>
+            <pc:sldMk cId="1495167305" sldId="267"/>
+            <ac:spMk id="3" creationId="{C25F7B17-B1C8-4E24-A2BB-20A6330C601E}"/>
+          </ac:spMkLst>
+        </pc:spChg>
+        <pc:spChg chg="add mod">
           <ac:chgData name="Mansur He" userId="2cd3e99d6a3c3959" providerId="LiveId" clId="{16CB9BD3-0FD0-435F-BA63-C692E6031789}" dt="2017-11-15T19:23:17.861" v="1618" actId="1076"/>
           <ac:spMkLst>
             <pc:docMk/>
@@ -947,6 +963,38 @@
             <ac:spMk id="4" creationId="{25007B00-97D3-4EA5-8578-6C8DD490F41C}"/>
           </ac:spMkLst>
         </pc:spChg>
+        <pc:spChg chg="add mod">
+          <ac:chgData name="Mansur He" userId="2cd3e99d6a3c3959" providerId="LiveId" clId="{16CB9BD3-0FD0-435F-BA63-C692E6031789}" dt="2017-11-16T22:44:11.076" v="1891" actId="11529"/>
+          <ac:spMkLst>
+            <pc:docMk/>
+            <pc:sldMk cId="1495167305" sldId="267"/>
+            <ac:spMk id="5" creationId="{BC166809-89EF-4FA6-A804-5F8E0C5614BA}"/>
+          </ac:spMkLst>
+        </pc:spChg>
+        <pc:spChg chg="add mod">
+          <ac:chgData name="Mansur He" userId="2cd3e99d6a3c3959" providerId="LiveId" clId="{16CB9BD3-0FD0-435F-BA63-C692E6031789}" dt="2017-11-16T22:44:19.255" v="1892" actId="11529"/>
+          <ac:spMkLst>
+            <pc:docMk/>
+            <pc:sldMk cId="1495167305" sldId="267"/>
+            <ac:spMk id="6" creationId="{5EE5616B-73E5-4D5C-84F0-D6A268A2DDD9}"/>
+          </ac:spMkLst>
+        </pc:spChg>
+        <pc:spChg chg="add mod">
+          <ac:chgData name="Mansur He" userId="2cd3e99d6a3c3959" providerId="LiveId" clId="{16CB9BD3-0FD0-435F-BA63-C692E6031789}" dt="2017-11-16T22:44:21.798" v="1893" actId="11529"/>
+          <ac:spMkLst>
+            <pc:docMk/>
+            <pc:sldMk cId="1495167305" sldId="267"/>
+            <ac:spMk id="7" creationId="{52B79740-11BB-4A4A-9D45-A29A2B5C8695}"/>
+          </ac:spMkLst>
+        </pc:spChg>
+        <pc:picChg chg="add del mod modCrop">
+          <ac:chgData name="Mansur He" userId="2cd3e99d6a3c3959" providerId="LiveId" clId="{16CB9BD3-0FD0-435F-BA63-C692E6031789}" dt="2017-11-16T22:31:42.463" v="1873" actId="478"/>
+          <ac:picMkLst>
+            <pc:docMk/>
+            <pc:sldMk cId="1495167305" sldId="267"/>
+            <ac:picMk id="2" creationId="{20836FED-62A4-476D-8AC0-DA3076F7A1B8}"/>
+          </ac:picMkLst>
+        </pc:picChg>
       </pc:sldChg>
       <pc:sldMasterChg chg="setBg modSldLayout">
         <pc:chgData name="Mansur He" userId="2cd3e99d6a3c3959" providerId="LiveId" clId="{16CB9BD3-0FD0-435F-BA63-C692E6031789}" dt="2017-11-15T19:22:35.187" v="1582" actId="20577"/>
@@ -1067,13 +1115,7 @@
       </p:grpSpPr>
       <p:sp>
         <p:nvSpPr>
-          <p:cNvPr id="2" name="Title 1">
-            <a:extLst>
-              <a:ext uri="{FF2B5EF4-FFF2-40B4-BE49-F238E27FC236}">
-                <a16:creationId xmlns:a16="http://schemas.microsoft.com/office/drawing/2014/main" id="{64CF5293-3D8F-433E-AF72-93AE3AD9ED0E}"/>
-              </a:ext>
-            </a:extLst>
-          </p:cNvPr>
+          <p:cNvPr id="2" name="Title 1"/>
           <p:cNvSpPr>
             <a:spLocks noGrp="1"/>
           </p:cNvSpPr>
@@ -1099,19 +1141,13 @@
               <a:rPr lang="en-US"/>
               <a:t>Click to edit Master title style</a:t>
             </a:r>
-            <a:endParaRPr lang="en-CA"/>
+            <a:endParaRPr lang="en-US" dirty="0"/>
           </a:p>
         </p:txBody>
       </p:sp>
       <p:sp>
         <p:nvSpPr>
-          <p:cNvPr id="3" name="Subtitle 2">
-            <a:extLst>
-              <a:ext uri="{FF2B5EF4-FFF2-40B4-BE49-F238E27FC236}">
-                <a16:creationId xmlns:a16="http://schemas.microsoft.com/office/drawing/2014/main" id="{E87955E1-F8F7-4C34-AEC7-825A8C454739}"/>
-              </a:ext>
-            </a:extLst>
-          </p:cNvPr>
+          <p:cNvPr id="3" name="Subtitle 2"/>
           <p:cNvSpPr>
             <a:spLocks noGrp="1"/>
           </p:cNvSpPr>
@@ -1170,19 +1206,13 @@
               <a:rPr lang="en-US"/>
               <a:t>Click to edit Master subtitle style</a:t>
             </a:r>
-            <a:endParaRPr lang="en-CA"/>
+            <a:endParaRPr lang="en-US" dirty="0"/>
           </a:p>
         </p:txBody>
       </p:sp>
       <p:sp>
         <p:nvSpPr>
-          <p:cNvPr id="4" name="Date Placeholder 3">
-            <a:extLst>
-              <a:ext uri="{FF2B5EF4-FFF2-40B4-BE49-F238E27FC236}">
-                <a16:creationId xmlns:a16="http://schemas.microsoft.com/office/drawing/2014/main" id="{AAB18EF2-647A-4704-8AEE-69185A3BBAAF}"/>
-              </a:ext>
-            </a:extLst>
-          </p:cNvPr>
+          <p:cNvPr id="4" name="Date Placeholder 3"/>
           <p:cNvSpPr>
             <a:spLocks noGrp="1"/>
           </p:cNvSpPr>
@@ -1205,13 +1235,7 @@
       </p:sp>
       <p:sp>
         <p:nvSpPr>
-          <p:cNvPr id="5" name="Footer Placeholder 4">
-            <a:extLst>
-              <a:ext uri="{FF2B5EF4-FFF2-40B4-BE49-F238E27FC236}">
-                <a16:creationId xmlns:a16="http://schemas.microsoft.com/office/drawing/2014/main" id="{C474308B-6601-4F30-BDC0-059DD9786B88}"/>
-              </a:ext>
-            </a:extLst>
-          </p:cNvPr>
+          <p:cNvPr id="5" name="Footer Placeholder 4"/>
           <p:cNvSpPr>
             <a:spLocks noGrp="1"/>
           </p:cNvSpPr>
@@ -1230,13 +1254,7 @@
       </p:sp>
       <p:sp>
         <p:nvSpPr>
-          <p:cNvPr id="6" name="Slide Number Placeholder 5">
-            <a:extLst>
-              <a:ext uri="{FF2B5EF4-FFF2-40B4-BE49-F238E27FC236}">
-                <a16:creationId xmlns:a16="http://schemas.microsoft.com/office/drawing/2014/main" id="{4D2822C2-40B5-4B57-8AF2-1666D146E756}"/>
-              </a:ext>
-            </a:extLst>
-          </p:cNvPr>
+          <p:cNvPr id="6" name="Slide Number Placeholder 5"/>
           <p:cNvSpPr>
             <a:spLocks noGrp="1"/>
           </p:cNvSpPr>
@@ -1260,7 +1278,7 @@
     </p:spTree>
     <p:extLst>
       <p:ext uri="{BB962C8B-B14F-4D97-AF65-F5344CB8AC3E}">
-        <p14:creationId xmlns:p14="http://schemas.microsoft.com/office/powerpoint/2010/main" val="1470253142"/>
+        <p14:creationId xmlns:p14="http://schemas.microsoft.com/office/powerpoint/2010/main" val="1182264936"/>
       </p:ext>
     </p:extLst>
   </p:cSld>
@@ -1289,13 +1307,7 @@
       </p:grpSpPr>
       <p:sp>
         <p:nvSpPr>
-          <p:cNvPr id="2" name="Title 1">
-            <a:extLst>
-              <a:ext uri="{FF2B5EF4-FFF2-40B4-BE49-F238E27FC236}">
-                <a16:creationId xmlns:a16="http://schemas.microsoft.com/office/drawing/2014/main" id="{8BA68F8E-8C1E-413A-A751-A1F9B70ECF23}"/>
-              </a:ext>
-            </a:extLst>
-          </p:cNvPr>
+          <p:cNvPr id="2" name="Title 1"/>
           <p:cNvSpPr>
             <a:spLocks noGrp="1"/>
           </p:cNvSpPr>
@@ -1312,19 +1324,13 @@
               <a:rPr lang="en-US"/>
               <a:t>Click to edit Master title style</a:t>
             </a:r>
-            <a:endParaRPr lang="en-CA"/>
+            <a:endParaRPr lang="en-US" dirty="0"/>
           </a:p>
         </p:txBody>
       </p:sp>
       <p:sp>
         <p:nvSpPr>
-          <p:cNvPr id="3" name="Vertical Text Placeholder 2">
-            <a:extLst>
-              <a:ext uri="{FF2B5EF4-FFF2-40B4-BE49-F238E27FC236}">
-                <a16:creationId xmlns:a16="http://schemas.microsoft.com/office/drawing/2014/main" id="{89CFDEF1-4DAF-47EF-B0A6-40F1DEC44871}"/>
-              </a:ext>
-            </a:extLst>
-          </p:cNvPr>
+          <p:cNvPr id="3" name="Vertical Text Placeholder 2"/>
           <p:cNvSpPr>
             <a:spLocks noGrp="1"/>
           </p:cNvSpPr>
@@ -1370,19 +1376,13 @@
               <a:rPr lang="en-US"/>
               <a:t>Fifth level</a:t>
             </a:r>
-            <a:endParaRPr lang="en-CA"/>
+            <a:endParaRPr lang="en-US" dirty="0"/>
           </a:p>
         </p:txBody>
       </p:sp>
       <p:sp>
         <p:nvSpPr>
-          <p:cNvPr id="4" name="Date Placeholder 3">
-            <a:extLst>
-              <a:ext uri="{FF2B5EF4-FFF2-40B4-BE49-F238E27FC236}">
-                <a16:creationId xmlns:a16="http://schemas.microsoft.com/office/drawing/2014/main" id="{B75F2627-6C39-4442-9101-B58C799C1434}"/>
-              </a:ext>
-            </a:extLst>
-          </p:cNvPr>
+          <p:cNvPr id="4" name="Date Placeholder 3"/>
           <p:cNvSpPr>
             <a:spLocks noGrp="1"/>
           </p:cNvSpPr>
@@ -1405,13 +1405,7 @@
       </p:sp>
       <p:sp>
         <p:nvSpPr>
-          <p:cNvPr id="5" name="Footer Placeholder 4">
-            <a:extLst>
-              <a:ext uri="{FF2B5EF4-FFF2-40B4-BE49-F238E27FC236}">
-                <a16:creationId xmlns:a16="http://schemas.microsoft.com/office/drawing/2014/main" id="{01A9C02D-03D8-485B-B14B-9A6FE4F2239D}"/>
-              </a:ext>
-            </a:extLst>
-          </p:cNvPr>
+          <p:cNvPr id="5" name="Footer Placeholder 4"/>
           <p:cNvSpPr>
             <a:spLocks noGrp="1"/>
           </p:cNvSpPr>
@@ -1430,13 +1424,7 @@
       </p:sp>
       <p:sp>
         <p:nvSpPr>
-          <p:cNvPr id="6" name="Slide Number Placeholder 5">
-            <a:extLst>
-              <a:ext uri="{FF2B5EF4-FFF2-40B4-BE49-F238E27FC236}">
-                <a16:creationId xmlns:a16="http://schemas.microsoft.com/office/drawing/2014/main" id="{343EE735-44FC-4D5A-96EC-712639661AFA}"/>
-              </a:ext>
-            </a:extLst>
-          </p:cNvPr>
+          <p:cNvPr id="6" name="Slide Number Placeholder 5"/>
           <p:cNvSpPr>
             <a:spLocks noGrp="1"/>
           </p:cNvSpPr>
@@ -1460,7 +1448,7 @@
     </p:spTree>
     <p:extLst>
       <p:ext uri="{BB962C8B-B14F-4D97-AF65-F5344CB8AC3E}">
-        <p14:creationId xmlns:p14="http://schemas.microsoft.com/office/powerpoint/2010/main" val="30563872"/>
+        <p14:creationId xmlns:p14="http://schemas.microsoft.com/office/powerpoint/2010/main" val="1001033487"/>
       </p:ext>
     </p:extLst>
   </p:cSld>
@@ -1489,13 +1477,7 @@
       </p:grpSpPr>
       <p:sp>
         <p:nvSpPr>
-          <p:cNvPr id="2" name="Vertical Title 1">
-            <a:extLst>
-              <a:ext uri="{FF2B5EF4-FFF2-40B4-BE49-F238E27FC236}">
-                <a16:creationId xmlns:a16="http://schemas.microsoft.com/office/drawing/2014/main" id="{E1D65AE2-53BC-41E2-A33D-45A348AC9076}"/>
-              </a:ext>
-            </a:extLst>
-          </p:cNvPr>
+          <p:cNvPr id="2" name="Vertical Title 1"/>
           <p:cNvSpPr>
             <a:spLocks noGrp="1"/>
           </p:cNvSpPr>
@@ -1517,19 +1499,13 @@
               <a:rPr lang="en-US"/>
               <a:t>Click to edit Master title style</a:t>
             </a:r>
-            <a:endParaRPr lang="en-CA"/>
+            <a:endParaRPr lang="en-US" dirty="0"/>
           </a:p>
         </p:txBody>
       </p:sp>
       <p:sp>
         <p:nvSpPr>
-          <p:cNvPr id="3" name="Vertical Text Placeholder 2">
-            <a:extLst>
-              <a:ext uri="{FF2B5EF4-FFF2-40B4-BE49-F238E27FC236}">
-                <a16:creationId xmlns:a16="http://schemas.microsoft.com/office/drawing/2014/main" id="{7576A507-2BAA-4D90-998C-D48ACF84D324}"/>
-              </a:ext>
-            </a:extLst>
-          </p:cNvPr>
+          <p:cNvPr id="3" name="Vertical Text Placeholder 2"/>
           <p:cNvSpPr>
             <a:spLocks noGrp="1"/>
           </p:cNvSpPr>
@@ -1580,19 +1556,13 @@
               <a:rPr lang="en-US"/>
               <a:t>Fifth level</a:t>
             </a:r>
-            <a:endParaRPr lang="en-CA"/>
+            <a:endParaRPr lang="en-US" dirty="0"/>
           </a:p>
         </p:txBody>
       </p:sp>
       <p:sp>
         <p:nvSpPr>
-          <p:cNvPr id="4" name="Date Placeholder 3">
-            <a:extLst>
-              <a:ext uri="{FF2B5EF4-FFF2-40B4-BE49-F238E27FC236}">
-                <a16:creationId xmlns:a16="http://schemas.microsoft.com/office/drawing/2014/main" id="{07AC277B-B6B7-49E8-8EDC-FA7861E54205}"/>
-              </a:ext>
-            </a:extLst>
-          </p:cNvPr>
+          <p:cNvPr id="4" name="Date Placeholder 3"/>
           <p:cNvSpPr>
             <a:spLocks noGrp="1"/>
           </p:cNvSpPr>
@@ -1615,13 +1585,7 @@
       </p:sp>
       <p:sp>
         <p:nvSpPr>
-          <p:cNvPr id="5" name="Footer Placeholder 4">
-            <a:extLst>
-              <a:ext uri="{FF2B5EF4-FFF2-40B4-BE49-F238E27FC236}">
-                <a16:creationId xmlns:a16="http://schemas.microsoft.com/office/drawing/2014/main" id="{C97B5E51-C063-4F54-850A-8987A69227BE}"/>
-              </a:ext>
-            </a:extLst>
-          </p:cNvPr>
+          <p:cNvPr id="5" name="Footer Placeholder 4"/>
           <p:cNvSpPr>
             <a:spLocks noGrp="1"/>
           </p:cNvSpPr>
@@ -1640,13 +1604,7 @@
       </p:sp>
       <p:sp>
         <p:nvSpPr>
-          <p:cNvPr id="6" name="Slide Number Placeholder 5">
-            <a:extLst>
-              <a:ext uri="{FF2B5EF4-FFF2-40B4-BE49-F238E27FC236}">
-                <a16:creationId xmlns:a16="http://schemas.microsoft.com/office/drawing/2014/main" id="{E12F5B98-52E6-4E71-99E4-F5C9F87F4521}"/>
-              </a:ext>
-            </a:extLst>
-          </p:cNvPr>
+          <p:cNvPr id="6" name="Slide Number Placeholder 5"/>
           <p:cNvSpPr>
             <a:spLocks noGrp="1"/>
           </p:cNvSpPr>
@@ -1670,7 +1628,7 @@
     </p:spTree>
     <p:extLst>
       <p:ext uri="{BB962C8B-B14F-4D97-AF65-F5344CB8AC3E}">
-        <p14:creationId xmlns:p14="http://schemas.microsoft.com/office/powerpoint/2010/main" val="770030270"/>
+        <p14:creationId xmlns:p14="http://schemas.microsoft.com/office/powerpoint/2010/main" val="1250271626"/>
       </p:ext>
     </p:extLst>
   </p:cSld>
@@ -1699,13 +1657,7 @@
       </p:grpSpPr>
       <p:sp>
         <p:nvSpPr>
-          <p:cNvPr id="2" name="Title 1">
-            <a:extLst>
-              <a:ext uri="{FF2B5EF4-FFF2-40B4-BE49-F238E27FC236}">
-                <a16:creationId xmlns:a16="http://schemas.microsoft.com/office/drawing/2014/main" id="{D115808F-CC12-451D-90CB-F6A44DA41287}"/>
-              </a:ext>
-            </a:extLst>
-          </p:cNvPr>
+          <p:cNvPr id="2" name="Title 1"/>
           <p:cNvSpPr>
             <a:spLocks noGrp="1"/>
           </p:cNvSpPr>
@@ -1722,19 +1674,13 @@
               <a:rPr lang="en-US"/>
               <a:t>Click to edit Master title style</a:t>
             </a:r>
-            <a:endParaRPr lang="en-CA"/>
+            <a:endParaRPr lang="en-US" dirty="0"/>
           </a:p>
         </p:txBody>
       </p:sp>
       <p:sp>
         <p:nvSpPr>
-          <p:cNvPr id="3" name="Content Placeholder 2">
-            <a:extLst>
-              <a:ext uri="{FF2B5EF4-FFF2-40B4-BE49-F238E27FC236}">
-                <a16:creationId xmlns:a16="http://schemas.microsoft.com/office/drawing/2014/main" id="{BFEAD333-2D9F-4D90-B762-5AFBD3311685}"/>
-              </a:ext>
-            </a:extLst>
-          </p:cNvPr>
+          <p:cNvPr id="3" name="Content Placeholder 2"/>
           <p:cNvSpPr>
             <a:spLocks noGrp="1"/>
           </p:cNvSpPr>
@@ -1780,19 +1726,13 @@
               <a:rPr lang="en-US"/>
               <a:t>Fifth level</a:t>
             </a:r>
-            <a:endParaRPr lang="en-CA"/>
+            <a:endParaRPr lang="en-US" dirty="0"/>
           </a:p>
         </p:txBody>
       </p:sp>
       <p:sp>
         <p:nvSpPr>
-          <p:cNvPr id="4" name="Date Placeholder 3">
-            <a:extLst>
-              <a:ext uri="{FF2B5EF4-FFF2-40B4-BE49-F238E27FC236}">
-                <a16:creationId xmlns:a16="http://schemas.microsoft.com/office/drawing/2014/main" id="{7384D9BE-D688-4683-9180-92910173BAB9}"/>
-              </a:ext>
-            </a:extLst>
-          </p:cNvPr>
+          <p:cNvPr id="4" name="Date Placeholder 3"/>
           <p:cNvSpPr>
             <a:spLocks noGrp="1"/>
           </p:cNvSpPr>
@@ -1815,13 +1755,7 @@
       </p:sp>
       <p:sp>
         <p:nvSpPr>
-          <p:cNvPr id="5" name="Footer Placeholder 4">
-            <a:extLst>
-              <a:ext uri="{FF2B5EF4-FFF2-40B4-BE49-F238E27FC236}">
-                <a16:creationId xmlns:a16="http://schemas.microsoft.com/office/drawing/2014/main" id="{D0314616-1C99-4A49-BF86-C854B704ED62}"/>
-              </a:ext>
-            </a:extLst>
-          </p:cNvPr>
+          <p:cNvPr id="5" name="Footer Placeholder 4"/>
           <p:cNvSpPr>
             <a:spLocks noGrp="1"/>
           </p:cNvSpPr>
@@ -1840,13 +1774,7 @@
       </p:sp>
       <p:sp>
         <p:nvSpPr>
-          <p:cNvPr id="6" name="Slide Number Placeholder 5">
-            <a:extLst>
-              <a:ext uri="{FF2B5EF4-FFF2-40B4-BE49-F238E27FC236}">
-                <a16:creationId xmlns:a16="http://schemas.microsoft.com/office/drawing/2014/main" id="{A89E4D2A-CB03-4F23-95E1-B64442F7FADB}"/>
-              </a:ext>
-            </a:extLst>
-          </p:cNvPr>
+          <p:cNvPr id="6" name="Slide Number Placeholder 5"/>
           <p:cNvSpPr>
             <a:spLocks noGrp="1"/>
           </p:cNvSpPr>
@@ -1870,7 +1798,7 @@
     </p:spTree>
     <p:extLst>
       <p:ext uri="{BB962C8B-B14F-4D97-AF65-F5344CB8AC3E}">
-        <p14:creationId xmlns:p14="http://schemas.microsoft.com/office/powerpoint/2010/main" val="3666017602"/>
+        <p14:creationId xmlns:p14="http://schemas.microsoft.com/office/powerpoint/2010/main" val="2079969860"/>
       </p:ext>
     </p:extLst>
   </p:cSld>
@@ -1899,13 +1827,7 @@
       </p:grpSpPr>
       <p:sp>
         <p:nvSpPr>
-          <p:cNvPr id="2" name="Title 1">
-            <a:extLst>
-              <a:ext uri="{FF2B5EF4-FFF2-40B4-BE49-F238E27FC236}">
-                <a16:creationId xmlns:a16="http://schemas.microsoft.com/office/drawing/2014/main" id="{84801448-1DB1-4144-A4D9-70245961B218}"/>
-              </a:ext>
-            </a:extLst>
-          </p:cNvPr>
+          <p:cNvPr id="2" name="Title 1"/>
           <p:cNvSpPr>
             <a:spLocks noGrp="1"/>
           </p:cNvSpPr>
@@ -1931,19 +1853,13 @@
               <a:rPr lang="en-US"/>
               <a:t>Click to edit Master title style</a:t>
             </a:r>
-            <a:endParaRPr lang="en-CA"/>
+            <a:endParaRPr lang="en-US" dirty="0"/>
           </a:p>
         </p:txBody>
       </p:sp>
       <p:sp>
         <p:nvSpPr>
-          <p:cNvPr id="3" name="Text Placeholder 2">
-            <a:extLst>
-              <a:ext uri="{FF2B5EF4-FFF2-40B4-BE49-F238E27FC236}">
-                <a16:creationId xmlns:a16="http://schemas.microsoft.com/office/drawing/2014/main" id="{084E28E2-FE8B-41D0-BE30-60AFF3A37410}"/>
-              </a:ext>
-            </a:extLst>
-          </p:cNvPr>
+          <p:cNvPr id="3" name="Text Placeholder 2"/>
           <p:cNvSpPr>
             <a:spLocks noGrp="1"/>
           </p:cNvSpPr>
@@ -2062,13 +1978,7 @@
       </p:sp>
       <p:sp>
         <p:nvSpPr>
-          <p:cNvPr id="4" name="Date Placeholder 3">
-            <a:extLst>
-              <a:ext uri="{FF2B5EF4-FFF2-40B4-BE49-F238E27FC236}">
-                <a16:creationId xmlns:a16="http://schemas.microsoft.com/office/drawing/2014/main" id="{B8A1F05F-AD43-442A-B507-C6BA4399D61B}"/>
-              </a:ext>
-            </a:extLst>
-          </p:cNvPr>
+          <p:cNvPr id="4" name="Date Placeholder 3"/>
           <p:cNvSpPr>
             <a:spLocks noGrp="1"/>
           </p:cNvSpPr>
@@ -2091,13 +2001,7 @@
       </p:sp>
       <p:sp>
         <p:nvSpPr>
-          <p:cNvPr id="5" name="Footer Placeholder 4">
-            <a:extLst>
-              <a:ext uri="{FF2B5EF4-FFF2-40B4-BE49-F238E27FC236}">
-                <a16:creationId xmlns:a16="http://schemas.microsoft.com/office/drawing/2014/main" id="{54A0BD7B-5AF9-4B79-9B42-55303CB0A45D}"/>
-              </a:ext>
-            </a:extLst>
-          </p:cNvPr>
+          <p:cNvPr id="5" name="Footer Placeholder 4"/>
           <p:cNvSpPr>
             <a:spLocks noGrp="1"/>
           </p:cNvSpPr>
@@ -2116,13 +2020,7 @@
       </p:sp>
       <p:sp>
         <p:nvSpPr>
-          <p:cNvPr id="6" name="Slide Number Placeholder 5">
-            <a:extLst>
-              <a:ext uri="{FF2B5EF4-FFF2-40B4-BE49-F238E27FC236}">
-                <a16:creationId xmlns:a16="http://schemas.microsoft.com/office/drawing/2014/main" id="{0D425077-9AD2-40C3-AEFC-9EE1D0CAAC64}"/>
-              </a:ext>
-            </a:extLst>
-          </p:cNvPr>
+          <p:cNvPr id="6" name="Slide Number Placeholder 5"/>
           <p:cNvSpPr>
             <a:spLocks noGrp="1"/>
           </p:cNvSpPr>
@@ -2146,7 +2044,7 @@
     </p:spTree>
     <p:extLst>
       <p:ext uri="{BB962C8B-B14F-4D97-AF65-F5344CB8AC3E}">
-        <p14:creationId xmlns:p14="http://schemas.microsoft.com/office/powerpoint/2010/main" val="1761760546"/>
+        <p14:creationId xmlns:p14="http://schemas.microsoft.com/office/powerpoint/2010/main" val="1102951379"/>
       </p:ext>
     </p:extLst>
   </p:cSld>
@@ -2175,13 +2073,7 @@
       </p:grpSpPr>
       <p:sp>
         <p:nvSpPr>
-          <p:cNvPr id="2" name="Title 1">
-            <a:extLst>
-              <a:ext uri="{FF2B5EF4-FFF2-40B4-BE49-F238E27FC236}">
-                <a16:creationId xmlns:a16="http://schemas.microsoft.com/office/drawing/2014/main" id="{E2128769-C145-4971-B9D5-A21443B4EB14}"/>
-              </a:ext>
-            </a:extLst>
-          </p:cNvPr>
+          <p:cNvPr id="2" name="Title 1"/>
           <p:cNvSpPr>
             <a:spLocks noGrp="1"/>
           </p:cNvSpPr>
@@ -2198,19 +2090,13 @@
               <a:rPr lang="en-US"/>
               <a:t>Click to edit Master title style</a:t>
             </a:r>
-            <a:endParaRPr lang="en-CA"/>
+            <a:endParaRPr lang="en-US" dirty="0"/>
           </a:p>
         </p:txBody>
       </p:sp>
       <p:sp>
         <p:nvSpPr>
-          <p:cNvPr id="3" name="Content Placeholder 2">
-            <a:extLst>
-              <a:ext uri="{FF2B5EF4-FFF2-40B4-BE49-F238E27FC236}">
-                <a16:creationId xmlns:a16="http://schemas.microsoft.com/office/drawing/2014/main" id="{AB5C779B-C98D-4DBB-8E0D-1B29A7B961B1}"/>
-              </a:ext>
-            </a:extLst>
-          </p:cNvPr>
+          <p:cNvPr id="3" name="Content Placeholder 2"/>
           <p:cNvSpPr>
             <a:spLocks noGrp="1"/>
           </p:cNvSpPr>
@@ -2261,19 +2147,13 @@
               <a:rPr lang="en-US"/>
               <a:t>Fifth level</a:t>
             </a:r>
-            <a:endParaRPr lang="en-CA"/>
+            <a:endParaRPr lang="en-US" dirty="0"/>
           </a:p>
         </p:txBody>
       </p:sp>
       <p:sp>
         <p:nvSpPr>
-          <p:cNvPr id="4" name="Content Placeholder 3">
-            <a:extLst>
-              <a:ext uri="{FF2B5EF4-FFF2-40B4-BE49-F238E27FC236}">
-                <a16:creationId xmlns:a16="http://schemas.microsoft.com/office/drawing/2014/main" id="{84C8B185-77F2-4AC7-A9EF-1D7F6F24DA1F}"/>
-              </a:ext>
-            </a:extLst>
-          </p:cNvPr>
+          <p:cNvPr id="4" name="Content Placeholder 3"/>
           <p:cNvSpPr>
             <a:spLocks noGrp="1"/>
           </p:cNvSpPr>
@@ -2324,19 +2204,13 @@
               <a:rPr lang="en-US"/>
               <a:t>Fifth level</a:t>
             </a:r>
-            <a:endParaRPr lang="en-CA"/>
+            <a:endParaRPr lang="en-US" dirty="0"/>
           </a:p>
         </p:txBody>
       </p:sp>
       <p:sp>
         <p:nvSpPr>
-          <p:cNvPr id="5" name="Date Placeholder 4">
-            <a:extLst>
-              <a:ext uri="{FF2B5EF4-FFF2-40B4-BE49-F238E27FC236}">
-                <a16:creationId xmlns:a16="http://schemas.microsoft.com/office/drawing/2014/main" id="{D7EFC317-5AA0-49FA-97BC-A90E25DDAF0F}"/>
-              </a:ext>
-            </a:extLst>
-          </p:cNvPr>
+          <p:cNvPr id="5" name="Date Placeholder 4"/>
           <p:cNvSpPr>
             <a:spLocks noGrp="1"/>
           </p:cNvSpPr>
@@ -2359,13 +2233,7 @@
       </p:sp>
       <p:sp>
         <p:nvSpPr>
-          <p:cNvPr id="6" name="Footer Placeholder 5">
-            <a:extLst>
-              <a:ext uri="{FF2B5EF4-FFF2-40B4-BE49-F238E27FC236}">
-                <a16:creationId xmlns:a16="http://schemas.microsoft.com/office/drawing/2014/main" id="{001E8A6B-B58A-4ECD-AB00-58A9F9BC37A3}"/>
-              </a:ext>
-            </a:extLst>
-          </p:cNvPr>
+          <p:cNvPr id="6" name="Footer Placeholder 5"/>
           <p:cNvSpPr>
             <a:spLocks noGrp="1"/>
           </p:cNvSpPr>
@@ -2384,13 +2252,7 @@
       </p:sp>
       <p:sp>
         <p:nvSpPr>
-          <p:cNvPr id="7" name="Slide Number Placeholder 6">
-            <a:extLst>
-              <a:ext uri="{FF2B5EF4-FFF2-40B4-BE49-F238E27FC236}">
-                <a16:creationId xmlns:a16="http://schemas.microsoft.com/office/drawing/2014/main" id="{618CBB88-1DFA-4F96-AFD0-EF33B4150F0A}"/>
-              </a:ext>
-            </a:extLst>
-          </p:cNvPr>
+          <p:cNvPr id="7" name="Slide Number Placeholder 6"/>
           <p:cNvSpPr>
             <a:spLocks noGrp="1"/>
           </p:cNvSpPr>
@@ -2414,7 +2276,7 @@
     </p:spTree>
     <p:extLst>
       <p:ext uri="{BB962C8B-B14F-4D97-AF65-F5344CB8AC3E}">
-        <p14:creationId xmlns:p14="http://schemas.microsoft.com/office/powerpoint/2010/main" val="511291665"/>
+        <p14:creationId xmlns:p14="http://schemas.microsoft.com/office/powerpoint/2010/main" val="2810553393"/>
       </p:ext>
     </p:extLst>
   </p:cSld>
@@ -2443,13 +2305,7 @@
       </p:grpSpPr>
       <p:sp>
         <p:nvSpPr>
-          <p:cNvPr id="2" name="Title 1">
-            <a:extLst>
-              <a:ext uri="{FF2B5EF4-FFF2-40B4-BE49-F238E27FC236}">
-                <a16:creationId xmlns:a16="http://schemas.microsoft.com/office/drawing/2014/main" id="{501B759F-5326-429A-9043-F8C60EE880E6}"/>
-              </a:ext>
-            </a:extLst>
-          </p:cNvPr>
+          <p:cNvPr id="2" name="Title 1"/>
           <p:cNvSpPr>
             <a:spLocks noGrp="1"/>
           </p:cNvSpPr>
@@ -2471,19 +2327,13 @@
               <a:rPr lang="en-US"/>
               <a:t>Click to edit Master title style</a:t>
             </a:r>
-            <a:endParaRPr lang="en-CA"/>
+            <a:endParaRPr lang="en-US" dirty="0"/>
           </a:p>
         </p:txBody>
       </p:sp>
       <p:sp>
         <p:nvSpPr>
-          <p:cNvPr id="3" name="Text Placeholder 2">
-            <a:extLst>
-              <a:ext uri="{FF2B5EF4-FFF2-40B4-BE49-F238E27FC236}">
-                <a16:creationId xmlns:a16="http://schemas.microsoft.com/office/drawing/2014/main" id="{B2AD7794-3169-45DF-B449-79D348CA3F9D}"/>
-              </a:ext>
-            </a:extLst>
-          </p:cNvPr>
+          <p:cNvPr id="3" name="Text Placeholder 2"/>
           <p:cNvSpPr>
             <a:spLocks noGrp="1"/>
           </p:cNvSpPr>
@@ -2548,13 +2398,7 @@
       </p:sp>
       <p:sp>
         <p:nvSpPr>
-          <p:cNvPr id="4" name="Content Placeholder 3">
-            <a:extLst>
-              <a:ext uri="{FF2B5EF4-FFF2-40B4-BE49-F238E27FC236}">
-                <a16:creationId xmlns:a16="http://schemas.microsoft.com/office/drawing/2014/main" id="{17FC3D05-12ED-48B6-B7AC-B04B4F40B0E4}"/>
-              </a:ext>
-            </a:extLst>
-          </p:cNvPr>
+          <p:cNvPr id="4" name="Content Placeholder 3"/>
           <p:cNvSpPr>
             <a:spLocks noGrp="1"/>
           </p:cNvSpPr>
@@ -2605,19 +2449,13 @@
               <a:rPr lang="en-US"/>
               <a:t>Fifth level</a:t>
             </a:r>
-            <a:endParaRPr lang="en-CA"/>
+            <a:endParaRPr lang="en-US" dirty="0"/>
           </a:p>
         </p:txBody>
       </p:sp>
       <p:sp>
         <p:nvSpPr>
-          <p:cNvPr id="5" name="Text Placeholder 4">
-            <a:extLst>
-              <a:ext uri="{FF2B5EF4-FFF2-40B4-BE49-F238E27FC236}">
-                <a16:creationId xmlns:a16="http://schemas.microsoft.com/office/drawing/2014/main" id="{5A4EF70B-F25E-4D78-83E7-C294BFC90B26}"/>
-              </a:ext>
-            </a:extLst>
-          </p:cNvPr>
+          <p:cNvPr id="5" name="Text Placeholder 4"/>
           <p:cNvSpPr>
             <a:spLocks noGrp="1"/>
           </p:cNvSpPr>
@@ -2682,13 +2520,7 @@
       </p:sp>
       <p:sp>
         <p:nvSpPr>
-          <p:cNvPr id="6" name="Content Placeholder 5">
-            <a:extLst>
-              <a:ext uri="{FF2B5EF4-FFF2-40B4-BE49-F238E27FC236}">
-                <a16:creationId xmlns:a16="http://schemas.microsoft.com/office/drawing/2014/main" id="{EE179BAF-8700-4F11-92BE-EA8A1D6FBAD6}"/>
-              </a:ext>
-            </a:extLst>
-          </p:cNvPr>
+          <p:cNvPr id="6" name="Content Placeholder 5"/>
           <p:cNvSpPr>
             <a:spLocks noGrp="1"/>
           </p:cNvSpPr>
@@ -2739,19 +2571,13 @@
               <a:rPr lang="en-US"/>
               <a:t>Fifth level</a:t>
             </a:r>
-            <a:endParaRPr lang="en-CA"/>
+            <a:endParaRPr lang="en-US" dirty="0"/>
           </a:p>
         </p:txBody>
       </p:sp>
       <p:sp>
         <p:nvSpPr>
-          <p:cNvPr id="7" name="Date Placeholder 6">
-            <a:extLst>
-              <a:ext uri="{FF2B5EF4-FFF2-40B4-BE49-F238E27FC236}">
-                <a16:creationId xmlns:a16="http://schemas.microsoft.com/office/drawing/2014/main" id="{44F4C26A-CD39-4ECB-82B7-9F896DA97AED}"/>
-              </a:ext>
-            </a:extLst>
-          </p:cNvPr>
+          <p:cNvPr id="7" name="Date Placeholder 6"/>
           <p:cNvSpPr>
             <a:spLocks noGrp="1"/>
           </p:cNvSpPr>
@@ -2774,13 +2600,7 @@
       </p:sp>
       <p:sp>
         <p:nvSpPr>
-          <p:cNvPr id="8" name="Footer Placeholder 7">
-            <a:extLst>
-              <a:ext uri="{FF2B5EF4-FFF2-40B4-BE49-F238E27FC236}">
-                <a16:creationId xmlns:a16="http://schemas.microsoft.com/office/drawing/2014/main" id="{F993ADF8-A162-4890-8C66-3A8116B7E379}"/>
-              </a:ext>
-            </a:extLst>
-          </p:cNvPr>
+          <p:cNvPr id="8" name="Footer Placeholder 7"/>
           <p:cNvSpPr>
             <a:spLocks noGrp="1"/>
           </p:cNvSpPr>
@@ -2799,13 +2619,7 @@
       </p:sp>
       <p:sp>
         <p:nvSpPr>
-          <p:cNvPr id="9" name="Slide Number Placeholder 8">
-            <a:extLst>
-              <a:ext uri="{FF2B5EF4-FFF2-40B4-BE49-F238E27FC236}">
-                <a16:creationId xmlns:a16="http://schemas.microsoft.com/office/drawing/2014/main" id="{09B8FC75-5869-42A9-8276-EEB06DAC56C9}"/>
-              </a:ext>
-            </a:extLst>
-          </p:cNvPr>
+          <p:cNvPr id="9" name="Slide Number Placeholder 8"/>
           <p:cNvSpPr>
             <a:spLocks noGrp="1"/>
           </p:cNvSpPr>
@@ -2829,7 +2643,7 @@
     </p:spTree>
     <p:extLst>
       <p:ext uri="{BB962C8B-B14F-4D97-AF65-F5344CB8AC3E}">
-        <p14:creationId xmlns:p14="http://schemas.microsoft.com/office/powerpoint/2010/main" val="2214827262"/>
+        <p14:creationId xmlns:p14="http://schemas.microsoft.com/office/powerpoint/2010/main" val="2628814679"/>
       </p:ext>
     </p:extLst>
   </p:cSld>
@@ -2858,13 +2672,7 @@
       </p:grpSpPr>
       <p:sp>
         <p:nvSpPr>
-          <p:cNvPr id="2" name="Title 1">
-            <a:extLst>
-              <a:ext uri="{FF2B5EF4-FFF2-40B4-BE49-F238E27FC236}">
-                <a16:creationId xmlns:a16="http://schemas.microsoft.com/office/drawing/2014/main" id="{7E884E89-8AD9-46FD-A341-4B341E224B78}"/>
-              </a:ext>
-            </a:extLst>
-          </p:cNvPr>
+          <p:cNvPr id="2" name="Title 1"/>
           <p:cNvSpPr>
             <a:spLocks noGrp="1"/>
           </p:cNvSpPr>
@@ -2881,19 +2689,13 @@
               <a:rPr lang="en-US"/>
               <a:t>Click to edit Master title style</a:t>
             </a:r>
-            <a:endParaRPr lang="en-CA"/>
+            <a:endParaRPr lang="en-US" dirty="0"/>
           </a:p>
         </p:txBody>
       </p:sp>
       <p:sp>
         <p:nvSpPr>
-          <p:cNvPr id="3" name="Date Placeholder 2">
-            <a:extLst>
-              <a:ext uri="{FF2B5EF4-FFF2-40B4-BE49-F238E27FC236}">
-                <a16:creationId xmlns:a16="http://schemas.microsoft.com/office/drawing/2014/main" id="{86BBA47C-0004-42EB-8408-C406F28E997F}"/>
-              </a:ext>
-            </a:extLst>
-          </p:cNvPr>
+          <p:cNvPr id="3" name="Date Placeholder 2"/>
           <p:cNvSpPr>
             <a:spLocks noGrp="1"/>
           </p:cNvSpPr>
@@ -2916,13 +2718,7 @@
       </p:sp>
       <p:sp>
         <p:nvSpPr>
-          <p:cNvPr id="4" name="Footer Placeholder 3">
-            <a:extLst>
-              <a:ext uri="{FF2B5EF4-FFF2-40B4-BE49-F238E27FC236}">
-                <a16:creationId xmlns:a16="http://schemas.microsoft.com/office/drawing/2014/main" id="{C5DB284E-98DA-43EF-A17E-A28ACC83243C}"/>
-              </a:ext>
-            </a:extLst>
-          </p:cNvPr>
+          <p:cNvPr id="4" name="Footer Placeholder 3"/>
           <p:cNvSpPr>
             <a:spLocks noGrp="1"/>
           </p:cNvSpPr>
@@ -2941,13 +2737,7 @@
       </p:sp>
       <p:sp>
         <p:nvSpPr>
-          <p:cNvPr id="5" name="Slide Number Placeholder 4">
-            <a:extLst>
-              <a:ext uri="{FF2B5EF4-FFF2-40B4-BE49-F238E27FC236}">
-                <a16:creationId xmlns:a16="http://schemas.microsoft.com/office/drawing/2014/main" id="{E47F63CE-D2F2-4558-A1C8-5B525089107D}"/>
-              </a:ext>
-            </a:extLst>
-          </p:cNvPr>
+          <p:cNvPr id="5" name="Slide Number Placeholder 4"/>
           <p:cNvSpPr>
             <a:spLocks noGrp="1"/>
           </p:cNvSpPr>
@@ -2971,7 +2761,7 @@
     </p:spTree>
     <p:extLst>
       <p:ext uri="{BB962C8B-B14F-4D97-AF65-F5344CB8AC3E}">
-        <p14:creationId xmlns:p14="http://schemas.microsoft.com/office/powerpoint/2010/main" val="3878126061"/>
+        <p14:creationId xmlns:p14="http://schemas.microsoft.com/office/powerpoint/2010/main" val="4074715518"/>
       </p:ext>
     </p:extLst>
   </p:cSld>
@@ -3000,13 +2790,7 @@
       </p:grpSpPr>
       <p:sp>
         <p:nvSpPr>
-          <p:cNvPr id="2" name="Date Placeholder 1">
-            <a:extLst>
-              <a:ext uri="{FF2B5EF4-FFF2-40B4-BE49-F238E27FC236}">
-                <a16:creationId xmlns:a16="http://schemas.microsoft.com/office/drawing/2014/main" id="{CFDB30D7-5D10-411F-920C-BFC265887EC3}"/>
-              </a:ext>
-            </a:extLst>
-          </p:cNvPr>
+          <p:cNvPr id="2" name="Date Placeholder 1"/>
           <p:cNvSpPr>
             <a:spLocks noGrp="1"/>
           </p:cNvSpPr>
@@ -3029,13 +2813,7 @@
       </p:sp>
       <p:sp>
         <p:nvSpPr>
-          <p:cNvPr id="3" name="Footer Placeholder 2">
-            <a:extLst>
-              <a:ext uri="{FF2B5EF4-FFF2-40B4-BE49-F238E27FC236}">
-                <a16:creationId xmlns:a16="http://schemas.microsoft.com/office/drawing/2014/main" id="{5CABEF04-2843-4533-9915-DB34EAA1AFBB}"/>
-              </a:ext>
-            </a:extLst>
-          </p:cNvPr>
+          <p:cNvPr id="3" name="Footer Placeholder 2"/>
           <p:cNvSpPr>
             <a:spLocks noGrp="1"/>
           </p:cNvSpPr>
@@ -3054,13 +2832,7 @@
       </p:sp>
       <p:sp>
         <p:nvSpPr>
-          <p:cNvPr id="4" name="Slide Number Placeholder 3">
-            <a:extLst>
-              <a:ext uri="{FF2B5EF4-FFF2-40B4-BE49-F238E27FC236}">
-                <a16:creationId xmlns:a16="http://schemas.microsoft.com/office/drawing/2014/main" id="{0A7A2886-FCB7-4A58-896C-29F94FAFF636}"/>
-              </a:ext>
-            </a:extLst>
-          </p:cNvPr>
+          <p:cNvPr id="4" name="Slide Number Placeholder 3"/>
           <p:cNvSpPr>
             <a:spLocks noGrp="1"/>
           </p:cNvSpPr>
@@ -3084,7 +2856,7 @@
     </p:spTree>
     <p:extLst>
       <p:ext uri="{BB962C8B-B14F-4D97-AF65-F5344CB8AC3E}">
-        <p14:creationId xmlns:p14="http://schemas.microsoft.com/office/powerpoint/2010/main" val="788093854"/>
+        <p14:creationId xmlns:p14="http://schemas.microsoft.com/office/powerpoint/2010/main" val="911761401"/>
       </p:ext>
     </p:extLst>
   </p:cSld>
@@ -3113,13 +2885,7 @@
       </p:grpSpPr>
       <p:sp>
         <p:nvSpPr>
-          <p:cNvPr id="2" name="Title 1">
-            <a:extLst>
-              <a:ext uri="{FF2B5EF4-FFF2-40B4-BE49-F238E27FC236}">
-                <a16:creationId xmlns:a16="http://schemas.microsoft.com/office/drawing/2014/main" id="{7F5A04E6-E45D-4C4F-B040-7F4754140247}"/>
-              </a:ext>
-            </a:extLst>
-          </p:cNvPr>
+          <p:cNvPr id="2" name="Title 1"/>
           <p:cNvSpPr>
             <a:spLocks noGrp="1"/>
           </p:cNvSpPr>
@@ -3145,19 +2911,13 @@
               <a:rPr lang="en-US"/>
               <a:t>Click to edit Master title style</a:t>
             </a:r>
-            <a:endParaRPr lang="en-CA"/>
+            <a:endParaRPr lang="en-US" dirty="0"/>
           </a:p>
         </p:txBody>
       </p:sp>
       <p:sp>
         <p:nvSpPr>
-          <p:cNvPr id="3" name="Content Placeholder 2">
-            <a:extLst>
-              <a:ext uri="{FF2B5EF4-FFF2-40B4-BE49-F238E27FC236}">
-                <a16:creationId xmlns:a16="http://schemas.microsoft.com/office/drawing/2014/main" id="{A7758F6D-19D4-44FB-A3E7-B2D4431BE7F6}"/>
-              </a:ext>
-            </a:extLst>
-          </p:cNvPr>
+          <p:cNvPr id="3" name="Content Placeholder 2"/>
           <p:cNvSpPr>
             <a:spLocks noGrp="1"/>
           </p:cNvSpPr>
@@ -3236,19 +2996,13 @@
               <a:rPr lang="en-US"/>
               <a:t>Fifth level</a:t>
             </a:r>
-            <a:endParaRPr lang="en-CA"/>
+            <a:endParaRPr lang="en-US" dirty="0"/>
           </a:p>
         </p:txBody>
       </p:sp>
       <p:sp>
         <p:nvSpPr>
-          <p:cNvPr id="4" name="Text Placeholder 3">
-            <a:extLst>
-              <a:ext uri="{FF2B5EF4-FFF2-40B4-BE49-F238E27FC236}">
-                <a16:creationId xmlns:a16="http://schemas.microsoft.com/office/drawing/2014/main" id="{255B5CE6-49C8-43F4-BD83-698E448665A4}"/>
-              </a:ext>
-            </a:extLst>
-          </p:cNvPr>
+          <p:cNvPr id="4" name="Text Placeholder 3"/>
           <p:cNvSpPr>
             <a:spLocks noGrp="1"/>
           </p:cNvSpPr>
@@ -3313,13 +3067,7 @@
       </p:sp>
       <p:sp>
         <p:nvSpPr>
-          <p:cNvPr id="5" name="Date Placeholder 4">
-            <a:extLst>
-              <a:ext uri="{FF2B5EF4-FFF2-40B4-BE49-F238E27FC236}">
-                <a16:creationId xmlns:a16="http://schemas.microsoft.com/office/drawing/2014/main" id="{075F20E2-D4AE-4741-977E-30EC12123F5C}"/>
-              </a:ext>
-            </a:extLst>
-          </p:cNvPr>
+          <p:cNvPr id="5" name="Date Placeholder 4"/>
           <p:cNvSpPr>
             <a:spLocks noGrp="1"/>
           </p:cNvSpPr>
@@ -3342,13 +3090,7 @@
       </p:sp>
       <p:sp>
         <p:nvSpPr>
-          <p:cNvPr id="6" name="Footer Placeholder 5">
-            <a:extLst>
-              <a:ext uri="{FF2B5EF4-FFF2-40B4-BE49-F238E27FC236}">
-                <a16:creationId xmlns:a16="http://schemas.microsoft.com/office/drawing/2014/main" id="{ED985AD3-586C-4D90-B905-41B449EF9E08}"/>
-              </a:ext>
-            </a:extLst>
-          </p:cNvPr>
+          <p:cNvPr id="6" name="Footer Placeholder 5"/>
           <p:cNvSpPr>
             <a:spLocks noGrp="1"/>
           </p:cNvSpPr>
@@ -3367,13 +3109,7 @@
       </p:sp>
       <p:sp>
         <p:nvSpPr>
-          <p:cNvPr id="7" name="Slide Number Placeholder 6">
-            <a:extLst>
-              <a:ext uri="{FF2B5EF4-FFF2-40B4-BE49-F238E27FC236}">
-                <a16:creationId xmlns:a16="http://schemas.microsoft.com/office/drawing/2014/main" id="{F76645D0-107C-4B62-8E9B-228FEE561B84}"/>
-              </a:ext>
-            </a:extLst>
-          </p:cNvPr>
+          <p:cNvPr id="7" name="Slide Number Placeholder 6"/>
           <p:cNvSpPr>
             <a:spLocks noGrp="1"/>
           </p:cNvSpPr>
@@ -3397,7 +3133,7 @@
     </p:spTree>
     <p:extLst>
       <p:ext uri="{BB962C8B-B14F-4D97-AF65-F5344CB8AC3E}">
-        <p14:creationId xmlns:p14="http://schemas.microsoft.com/office/powerpoint/2010/main" val="1666322605"/>
+        <p14:creationId xmlns:p14="http://schemas.microsoft.com/office/powerpoint/2010/main" val="3616256626"/>
       </p:ext>
     </p:extLst>
   </p:cSld>
@@ -3426,13 +3162,7 @@
       </p:grpSpPr>
       <p:sp>
         <p:nvSpPr>
-          <p:cNvPr id="2" name="Title 1">
-            <a:extLst>
-              <a:ext uri="{FF2B5EF4-FFF2-40B4-BE49-F238E27FC236}">
-                <a16:creationId xmlns:a16="http://schemas.microsoft.com/office/drawing/2014/main" id="{C292AD73-012F-4C7B-BE07-75E893356973}"/>
-              </a:ext>
-            </a:extLst>
-          </p:cNvPr>
+          <p:cNvPr id="2" name="Title 1"/>
           <p:cNvSpPr>
             <a:spLocks noGrp="1"/>
           </p:cNvSpPr>
@@ -3458,21 +3188,15 @@
               <a:rPr lang="en-US"/>
               <a:t>Click to edit Master title style</a:t>
             </a:r>
-            <a:endParaRPr lang="en-CA"/>
+            <a:endParaRPr lang="en-US" dirty="0"/>
           </a:p>
         </p:txBody>
       </p:sp>
       <p:sp>
         <p:nvSpPr>
-          <p:cNvPr id="3" name="Picture Placeholder 2">
-            <a:extLst>
-              <a:ext uri="{FF2B5EF4-FFF2-40B4-BE49-F238E27FC236}">
-                <a16:creationId xmlns:a16="http://schemas.microsoft.com/office/drawing/2014/main" id="{13679370-5616-40A8-AAD9-95C33DBB5D4F}"/>
-              </a:ext>
-            </a:extLst>
-          </p:cNvPr>
+          <p:cNvPr id="3" name="Picture Placeholder 2"/>
           <p:cNvSpPr>
-            <a:spLocks noGrp="1"/>
+            <a:spLocks noGrp="1" noChangeAspect="1"/>
           </p:cNvSpPr>
           <p:nvPr>
             <p:ph type="pic" idx="1"/>
@@ -3485,7 +3209,7 @@
           </a:xfrm>
         </p:spPr>
         <p:txBody>
-          <a:bodyPr/>
+          <a:bodyPr anchor="t"/>
           <a:lstStyle>
             <a:lvl1pPr marL="0" indent="0">
               <a:buNone/>
@@ -3525,19 +3249,17 @@
             </a:lvl9pPr>
           </a:lstStyle>
           <a:p>
-            <a:endParaRPr lang="en-CA"/>
+            <a:r>
+              <a:rPr lang="en-US"/>
+              <a:t>Click icon to add picture</a:t>
+            </a:r>
+            <a:endParaRPr lang="en-US" dirty="0"/>
           </a:p>
         </p:txBody>
       </p:sp>
       <p:sp>
         <p:nvSpPr>
-          <p:cNvPr id="4" name="Text Placeholder 3">
-            <a:extLst>
-              <a:ext uri="{FF2B5EF4-FFF2-40B4-BE49-F238E27FC236}">
-                <a16:creationId xmlns:a16="http://schemas.microsoft.com/office/drawing/2014/main" id="{6C189195-1218-4FC1-80BA-632A55BCC024}"/>
-              </a:ext>
-            </a:extLst>
-          </p:cNvPr>
+          <p:cNvPr id="4" name="Text Placeholder 3"/>
           <p:cNvSpPr>
             <a:spLocks noGrp="1"/>
           </p:cNvSpPr>
@@ -3602,13 +3324,7 @@
       </p:sp>
       <p:sp>
         <p:nvSpPr>
-          <p:cNvPr id="5" name="Date Placeholder 4">
-            <a:extLst>
-              <a:ext uri="{FF2B5EF4-FFF2-40B4-BE49-F238E27FC236}">
-                <a16:creationId xmlns:a16="http://schemas.microsoft.com/office/drawing/2014/main" id="{D640FAC3-C234-4A5B-B0E6-D8CEBB6C2C4D}"/>
-              </a:ext>
-            </a:extLst>
-          </p:cNvPr>
+          <p:cNvPr id="5" name="Date Placeholder 4"/>
           <p:cNvSpPr>
             <a:spLocks noGrp="1"/>
           </p:cNvSpPr>
@@ -3631,13 +3347,7 @@
       </p:sp>
       <p:sp>
         <p:nvSpPr>
-          <p:cNvPr id="6" name="Footer Placeholder 5">
-            <a:extLst>
-              <a:ext uri="{FF2B5EF4-FFF2-40B4-BE49-F238E27FC236}">
-                <a16:creationId xmlns:a16="http://schemas.microsoft.com/office/drawing/2014/main" id="{3F59E7DF-68F3-4D22-9212-40EB3918DBE2}"/>
-              </a:ext>
-            </a:extLst>
-          </p:cNvPr>
+          <p:cNvPr id="6" name="Footer Placeholder 5"/>
           <p:cNvSpPr>
             <a:spLocks noGrp="1"/>
           </p:cNvSpPr>
@@ -3656,13 +3366,7 @@
       </p:sp>
       <p:sp>
         <p:nvSpPr>
-          <p:cNvPr id="7" name="Slide Number Placeholder 6">
-            <a:extLst>
-              <a:ext uri="{FF2B5EF4-FFF2-40B4-BE49-F238E27FC236}">
-                <a16:creationId xmlns:a16="http://schemas.microsoft.com/office/drawing/2014/main" id="{3CB51B97-AA5A-455A-A25B-6AD8ADF9350A}"/>
-              </a:ext>
-            </a:extLst>
-          </p:cNvPr>
+          <p:cNvPr id="7" name="Slide Number Placeholder 6"/>
           <p:cNvSpPr>
             <a:spLocks noGrp="1"/>
           </p:cNvSpPr>
@@ -3686,7 +3390,7 @@
     </p:spTree>
     <p:extLst>
       <p:ext uri="{BB962C8B-B14F-4D97-AF65-F5344CB8AC3E}">
-        <p14:creationId xmlns:p14="http://schemas.microsoft.com/office/powerpoint/2010/main" val="620821994"/>
+        <p14:creationId xmlns:p14="http://schemas.microsoft.com/office/powerpoint/2010/main" val="3162468323"/>
       </p:ext>
     </p:extLst>
   </p:cSld>
@@ -3700,25 +3404,9 @@
 <p:sldMaster xmlns:a="http://schemas.openxmlformats.org/drawingml/2006/main" xmlns:r="http://schemas.openxmlformats.org/officeDocument/2006/relationships" xmlns:p="http://schemas.openxmlformats.org/presentationml/2006/main">
   <p:cSld>
     <p:bg>
-      <p:bgPr>
-        <a:gradFill flip="none" rotWithShape="1">
-          <a:gsLst>
-            <a:gs pos="100000">
-              <a:schemeClr val="bg1">
-                <a:lumMod val="85000"/>
-              </a:schemeClr>
-            </a:gs>
-            <a:gs pos="30000">
-              <a:schemeClr val="bg1"/>
-            </a:gs>
-          </a:gsLst>
-          <a:path path="circle">
-            <a:fillToRect l="50000" t="50000" r="50000" b="50000"/>
-          </a:path>
-          <a:tileRect/>
-        </a:gradFill>
-        <a:effectLst/>
-      </p:bgPr>
+      <p:bgRef idx="1001">
+        <a:schemeClr val="bg1"/>
+      </p:bgRef>
     </p:bg>
     <p:spTree>
       <p:nvGrpSpPr>
@@ -3736,13 +3424,7 @@
       </p:grpSpPr>
       <p:sp>
         <p:nvSpPr>
-          <p:cNvPr id="2" name="Title Placeholder 1">
-            <a:extLst>
-              <a:ext uri="{FF2B5EF4-FFF2-40B4-BE49-F238E27FC236}">
-                <a16:creationId xmlns:a16="http://schemas.microsoft.com/office/drawing/2014/main" id="{4099CC62-C86A-41A4-89A8-142A3B69244C}"/>
-              </a:ext>
-            </a:extLst>
-          </p:cNvPr>
+          <p:cNvPr id="2" name="Title Placeholder 1"/>
           <p:cNvSpPr>
             <a:spLocks noGrp="1"/>
           </p:cNvSpPr>
@@ -3769,19 +3451,13 @@
               <a:rPr lang="en-US"/>
               <a:t>Click to edit Master title style</a:t>
             </a:r>
-            <a:endParaRPr lang="en-CA"/>
+            <a:endParaRPr lang="en-US" dirty="0"/>
           </a:p>
         </p:txBody>
       </p:sp>
       <p:sp>
         <p:nvSpPr>
-          <p:cNvPr id="3" name="Text Placeholder 2">
-            <a:extLst>
-              <a:ext uri="{FF2B5EF4-FFF2-40B4-BE49-F238E27FC236}">
-                <a16:creationId xmlns:a16="http://schemas.microsoft.com/office/drawing/2014/main" id="{AFF574A3-F114-431F-B3E9-E4318C62A0B1}"/>
-              </a:ext>
-            </a:extLst>
-          </p:cNvPr>
+          <p:cNvPr id="3" name="Text Placeholder 2"/>
           <p:cNvSpPr>
             <a:spLocks noGrp="1"/>
           </p:cNvSpPr>
@@ -3837,19 +3513,13 @@
               <a:rPr lang="en-US"/>
               <a:t>Fifth level</a:t>
             </a:r>
-            <a:endParaRPr lang="en-CA"/>
+            <a:endParaRPr lang="en-US" dirty="0"/>
           </a:p>
         </p:txBody>
       </p:sp>
       <p:sp>
         <p:nvSpPr>
-          <p:cNvPr id="4" name="Date Placeholder 3">
-            <a:extLst>
-              <a:ext uri="{FF2B5EF4-FFF2-40B4-BE49-F238E27FC236}">
-                <a16:creationId xmlns:a16="http://schemas.microsoft.com/office/drawing/2014/main" id="{2935D6DD-4EE0-4380-8D6C-D38CF0B494C0}"/>
-              </a:ext>
-            </a:extLst>
-          </p:cNvPr>
+          <p:cNvPr id="4" name="Date Placeholder 3"/>
           <p:cNvSpPr>
             <a:spLocks noGrp="1"/>
           </p:cNvSpPr>
@@ -3890,13 +3560,7 @@
       </p:sp>
       <p:sp>
         <p:nvSpPr>
-          <p:cNvPr id="5" name="Footer Placeholder 4">
-            <a:extLst>
-              <a:ext uri="{FF2B5EF4-FFF2-40B4-BE49-F238E27FC236}">
-                <a16:creationId xmlns:a16="http://schemas.microsoft.com/office/drawing/2014/main" id="{4BC8BC77-3BF9-4B21-B299-08AE90B2A77C}"/>
-              </a:ext>
-            </a:extLst>
-          </p:cNvPr>
+          <p:cNvPr id="5" name="Footer Placeholder 4"/>
           <p:cNvSpPr>
             <a:spLocks noGrp="1"/>
           </p:cNvSpPr>
@@ -3933,13 +3597,7 @@
       </p:sp>
       <p:sp>
         <p:nvSpPr>
-          <p:cNvPr id="6" name="Slide Number Placeholder 5">
-            <a:extLst>
-              <a:ext uri="{FF2B5EF4-FFF2-40B4-BE49-F238E27FC236}">
-                <a16:creationId xmlns:a16="http://schemas.microsoft.com/office/drawing/2014/main" id="{C3D25A9C-48DF-4105-A6D0-870E20FF7613}"/>
-              </a:ext>
-            </a:extLst>
-          </p:cNvPr>
+          <p:cNvPr id="6" name="Slide Number Placeholder 5"/>
           <p:cNvSpPr>
             <a:spLocks noGrp="1"/>
           </p:cNvSpPr>
@@ -3981,23 +3639,23 @@
     </p:spTree>
     <p:extLst>
       <p:ext uri="{BB962C8B-B14F-4D97-AF65-F5344CB8AC3E}">
-        <p14:creationId xmlns:p14="http://schemas.microsoft.com/office/powerpoint/2010/main" val="1150089533"/>
+        <p14:creationId xmlns:p14="http://schemas.microsoft.com/office/powerpoint/2010/main" val="2441988093"/>
       </p:ext>
     </p:extLst>
   </p:cSld>
   <p:clrMap bg1="lt1" tx1="dk1" bg2="lt2" tx2="dk2" accent1="accent1" accent2="accent2" accent3="accent3" accent4="accent4" accent5="accent5" accent6="accent6" hlink="hlink" folHlink="folHlink"/>
   <p:sldLayoutIdLst>
-    <p:sldLayoutId id="2147483924" r:id="rId1"/>
-    <p:sldLayoutId id="2147483925" r:id="rId2"/>
-    <p:sldLayoutId id="2147483926" r:id="rId3"/>
-    <p:sldLayoutId id="2147483927" r:id="rId4"/>
-    <p:sldLayoutId id="2147483928" r:id="rId5"/>
-    <p:sldLayoutId id="2147483929" r:id="rId6"/>
-    <p:sldLayoutId id="2147483930" r:id="rId7"/>
-    <p:sldLayoutId id="2147483931" r:id="rId8"/>
-    <p:sldLayoutId id="2147483932" r:id="rId9"/>
-    <p:sldLayoutId id="2147483933" r:id="rId10"/>
-    <p:sldLayoutId id="2147483934" r:id="rId11"/>
+    <p:sldLayoutId id="2147483960" r:id="rId1"/>
+    <p:sldLayoutId id="2147483961" r:id="rId2"/>
+    <p:sldLayoutId id="2147483962" r:id="rId3"/>
+    <p:sldLayoutId id="2147483963" r:id="rId4"/>
+    <p:sldLayoutId id="2147483964" r:id="rId5"/>
+    <p:sldLayoutId id="2147483965" r:id="rId6"/>
+    <p:sldLayoutId id="2147483966" r:id="rId7"/>
+    <p:sldLayoutId id="2147483967" r:id="rId8"/>
+    <p:sldLayoutId id="2147483968" r:id="rId9"/>
+    <p:sldLayoutId id="2147483969" r:id="rId10"/>
+    <p:sldLayoutId id="2147483970" r:id="rId11"/>
   </p:sldLayoutIdLst>
   <p:txStyles>
     <p:titleStyle>
@@ -4304,6 +3962,54 @@
           <a:chExt cx="0" cy="0"/>
         </a:xfrm>
       </p:grpSpPr>
+      <p:pic>
+        <p:nvPicPr>
+          <p:cNvPr id="3" name="Picture 2">
+            <a:extLst>
+              <a:ext uri="{FF2B5EF4-FFF2-40B4-BE49-F238E27FC236}">
+                <a16:creationId xmlns:a16="http://schemas.microsoft.com/office/drawing/2014/main" id="{56E381CE-93BF-4CDB-B83C-F1D427444DA4}"/>
+              </a:ext>
+            </a:extLst>
+          </p:cNvPr>
+          <p:cNvPicPr>
+            <a:picLocks noChangeAspect="1"/>
+          </p:cNvPicPr>
+          <p:nvPr/>
+        </p:nvPicPr>
+        <p:blipFill>
+          <a:blip r:embed="rId2">
+            <a:extLst>
+              <a:ext uri="{BEBA8EAE-BF5A-486C-A8C5-ECC9F3942E4B}">
+                <a14:imgProps xmlns:a14="http://schemas.microsoft.com/office/drawing/2010/main">
+                  <a14:imgLayer r:embed="rId3">
+                    <a14:imgEffect>
+                      <a14:sharpenSoften amount="25000"/>
+                    </a14:imgEffect>
+                    <a14:imgEffect>
+                      <a14:colorTemperature colorTemp="5300"/>
+                    </a14:imgEffect>
+                    <a14:imgEffect>
+                      <a14:saturation sat="66000"/>
+                    </a14:imgEffect>
+                  </a14:imgLayer>
+                </a14:imgProps>
+              </a:ext>
+            </a:extLst>
+          </a:blip>
+          <a:stretch>
+            <a:fillRect/>
+          </a:stretch>
+        </p:blipFill>
+        <p:spPr>
+          <a:xfrm>
+            <a:off x="-22303" y="-22302"/>
+            <a:ext cx="12561051" cy="6969511"/>
+          </a:xfrm>
+          <a:prstGeom prst="rect">
+            <a:avLst/>
+          </a:prstGeom>
+        </p:spPr>
+      </p:pic>
       <p:sp>
         <p:nvSpPr>
           <p:cNvPr id="5" name="TextBox 4">
@@ -4707,6 +4413,190 @@
               </a:rPr>
               <a:t>System Overview</a:t>
             </a:r>
+          </a:p>
+        </p:txBody>
+      </p:sp>
+      <p:sp>
+        <p:nvSpPr>
+          <p:cNvPr id="3" name="Flowchart: Process 2">
+            <a:extLst>
+              <a:ext uri="{FF2B5EF4-FFF2-40B4-BE49-F238E27FC236}">
+                <a16:creationId xmlns:a16="http://schemas.microsoft.com/office/drawing/2014/main" id="{C25F7B17-B1C8-4E24-A2BB-20A6330C601E}"/>
+              </a:ext>
+            </a:extLst>
+          </p:cNvPr>
+          <p:cNvSpPr/>
+          <p:nvPr/>
+        </p:nvSpPr>
+        <p:spPr>
+          <a:xfrm>
+            <a:off x="1059366" y="1918010"/>
+            <a:ext cx="2386361" cy="1271239"/>
+          </a:xfrm>
+          <a:prstGeom prst="flowChartProcess">
+            <a:avLst/>
+          </a:prstGeom>
+        </p:spPr>
+        <p:style>
+          <a:lnRef idx="2">
+            <a:schemeClr val="accent1">
+              <a:shade val="50000"/>
+            </a:schemeClr>
+          </a:lnRef>
+          <a:fillRef idx="1">
+            <a:schemeClr val="accent1"/>
+          </a:fillRef>
+          <a:effectRef idx="0">
+            <a:schemeClr val="accent1"/>
+          </a:effectRef>
+          <a:fontRef idx="minor">
+            <a:schemeClr val="lt1"/>
+          </a:fontRef>
+        </p:style>
+        <p:txBody>
+          <a:bodyPr rtlCol="0" anchor="ctr"/>
+          <a:lstStyle/>
+          <a:p>
+            <a:pPr algn="ctr"/>
+            <a:endParaRPr lang="en-CA"/>
+          </a:p>
+        </p:txBody>
+      </p:sp>
+      <p:sp>
+        <p:nvSpPr>
+          <p:cNvPr id="5" name="Flowchart: Process 4">
+            <a:extLst>
+              <a:ext uri="{FF2B5EF4-FFF2-40B4-BE49-F238E27FC236}">
+                <a16:creationId xmlns:a16="http://schemas.microsoft.com/office/drawing/2014/main" id="{BC166809-89EF-4FA6-A804-5F8E0C5614BA}"/>
+              </a:ext>
+            </a:extLst>
+          </p:cNvPr>
+          <p:cNvSpPr/>
+          <p:nvPr/>
+        </p:nvSpPr>
+        <p:spPr>
+          <a:xfrm>
+            <a:off x="3947532" y="2007220"/>
+            <a:ext cx="1984917" cy="1182029"/>
+          </a:xfrm>
+          <a:prstGeom prst="flowChartProcess">
+            <a:avLst/>
+          </a:prstGeom>
+        </p:spPr>
+        <p:style>
+          <a:lnRef idx="2">
+            <a:schemeClr val="accent1">
+              <a:shade val="50000"/>
+            </a:schemeClr>
+          </a:lnRef>
+          <a:fillRef idx="1">
+            <a:schemeClr val="accent1"/>
+          </a:fillRef>
+          <a:effectRef idx="0">
+            <a:schemeClr val="accent1"/>
+          </a:effectRef>
+          <a:fontRef idx="minor">
+            <a:schemeClr val="lt1"/>
+          </a:fontRef>
+        </p:style>
+        <p:txBody>
+          <a:bodyPr rtlCol="0" anchor="ctr"/>
+          <a:lstStyle/>
+          <a:p>
+            <a:pPr algn="ctr"/>
+            <a:endParaRPr lang="en-CA"/>
+          </a:p>
+        </p:txBody>
+      </p:sp>
+      <p:sp>
+        <p:nvSpPr>
+          <p:cNvPr id="6" name="Flowchart: Process 5">
+            <a:extLst>
+              <a:ext uri="{FF2B5EF4-FFF2-40B4-BE49-F238E27FC236}">
+                <a16:creationId xmlns:a16="http://schemas.microsoft.com/office/drawing/2014/main" id="{5EE5616B-73E5-4D5C-84F0-D6A268A2DDD9}"/>
+              </a:ext>
+            </a:extLst>
+          </p:cNvPr>
+          <p:cNvSpPr/>
+          <p:nvPr/>
+        </p:nvSpPr>
+        <p:spPr>
+          <a:xfrm>
+            <a:off x="6434254" y="2040673"/>
+            <a:ext cx="2196790" cy="1148576"/>
+          </a:xfrm>
+          <a:prstGeom prst="flowChartProcess">
+            <a:avLst/>
+          </a:prstGeom>
+        </p:spPr>
+        <p:style>
+          <a:lnRef idx="2">
+            <a:schemeClr val="accent1">
+              <a:shade val="50000"/>
+            </a:schemeClr>
+          </a:lnRef>
+          <a:fillRef idx="1">
+            <a:schemeClr val="accent1"/>
+          </a:fillRef>
+          <a:effectRef idx="0">
+            <a:schemeClr val="accent1"/>
+          </a:effectRef>
+          <a:fontRef idx="minor">
+            <a:schemeClr val="lt1"/>
+          </a:fontRef>
+        </p:style>
+        <p:txBody>
+          <a:bodyPr rtlCol="0" anchor="ctr"/>
+          <a:lstStyle/>
+          <a:p>
+            <a:pPr algn="ctr"/>
+            <a:endParaRPr lang="en-CA"/>
+          </a:p>
+        </p:txBody>
+      </p:sp>
+      <p:sp>
+        <p:nvSpPr>
+          <p:cNvPr id="7" name="Flowchart: Process 6">
+            <a:extLst>
+              <a:ext uri="{FF2B5EF4-FFF2-40B4-BE49-F238E27FC236}">
+                <a16:creationId xmlns:a16="http://schemas.microsoft.com/office/drawing/2014/main" id="{52B79740-11BB-4A4A-9D45-A29A2B5C8695}"/>
+              </a:ext>
+            </a:extLst>
+          </p:cNvPr>
+          <p:cNvSpPr/>
+          <p:nvPr/>
+        </p:nvSpPr>
+        <p:spPr>
+          <a:xfrm>
+            <a:off x="9121698" y="2007220"/>
+            <a:ext cx="1984917" cy="1182029"/>
+          </a:xfrm>
+          <a:prstGeom prst="flowChartProcess">
+            <a:avLst/>
+          </a:prstGeom>
+        </p:spPr>
+        <p:style>
+          <a:lnRef idx="2">
+            <a:schemeClr val="accent1">
+              <a:shade val="50000"/>
+            </a:schemeClr>
+          </a:lnRef>
+          <a:fillRef idx="1">
+            <a:schemeClr val="accent1"/>
+          </a:fillRef>
+          <a:effectRef idx="0">
+            <a:schemeClr val="accent1"/>
+          </a:effectRef>
+          <a:fontRef idx="minor">
+            <a:schemeClr val="lt1"/>
+          </a:fontRef>
+        </p:style>
+        <p:txBody>
+          <a:bodyPr rtlCol="0" anchor="ctr"/>
+          <a:lstStyle/>
+          <a:p>
+            <a:pPr algn="ctr"/>
+            <a:endParaRPr lang="en-CA"/>
           </a:p>
         </p:txBody>
       </p:sp>
@@ -15504,7 +15394,7 @@
 <file path=ppt/theme/theme1.xml><?xml version="1.0" encoding="utf-8"?>
 <a:theme xmlns:a="http://schemas.openxmlformats.org/drawingml/2006/main" name="Office Theme">
   <a:themeElements>
-    <a:clrScheme name="Office">
+    <a:clrScheme name="Office Theme">
       <a:dk1>
         <a:sysClr val="windowText" lastClr="000000"/>
       </a:dk1>
@@ -15518,22 +15408,22 @@
         <a:srgbClr val="E7E6E6"/>
       </a:lt2>
       <a:accent1>
-        <a:srgbClr val="4472C4"/>
+        <a:srgbClr val="1D9A78"/>
       </a:accent1>
       <a:accent2>
-        <a:srgbClr val="ED7D31"/>
+        <a:srgbClr val="8BC145"/>
       </a:accent2>
       <a:accent3>
-        <a:srgbClr val="A5A5A5"/>
+        <a:srgbClr val="36AFCE"/>
       </a:accent3>
       <a:accent4>
-        <a:srgbClr val="FFC000"/>
+        <a:srgbClr val="1D6FA9"/>
       </a:accent4>
       <a:accent5>
-        <a:srgbClr val="5B9BD5"/>
+        <a:srgbClr val="B74919"/>
       </a:accent5>
       <a:accent6>
-        <a:srgbClr val="70AD47"/>
+        <a:srgbClr val="F19D19"/>
       </a:accent6>
       <a:hlink>
         <a:srgbClr val="0563C1"/>
@@ -15542,7 +15432,7 @@
         <a:srgbClr val="954F72"/>
       </a:folHlink>
     </a:clrScheme>
-    <a:fontScheme name="Office">
+    <a:fontScheme name="Office Theme">
       <a:majorFont>
         <a:latin typeface="Calibri Light" panose="020F0302020204030204"/>
         <a:ea typeface=""/>
@@ -15577,23 +15467,6 @@
         <a:font script="Viet" typeface="Times New Roman"/>
         <a:font script="Uigh" typeface="Microsoft Uighur"/>
         <a:font script="Geor" typeface="Sylfaen"/>
-        <a:font script="Armn" typeface="Arial"/>
-        <a:font script="Bugi" typeface="Leelawadee UI"/>
-        <a:font script="Bopo" typeface="Microsoft JhengHei"/>
-        <a:font script="Java" typeface="Javanese Text"/>
-        <a:font script="Lisu" typeface="Segoe UI"/>
-        <a:font script="Mymr" typeface="Myanmar Text"/>
-        <a:font script="Nkoo" typeface="Ebrima"/>
-        <a:font script="Olck" typeface="Nirmala UI"/>
-        <a:font script="Osma" typeface="Ebrima"/>
-        <a:font script="Phag" typeface="Phagspa"/>
-        <a:font script="Syrn" typeface="Estrangelo Edessa"/>
-        <a:font script="Syrj" typeface="Estrangelo Edessa"/>
-        <a:font script="Syre" typeface="Estrangelo Edessa"/>
-        <a:font script="Sora" typeface="Nirmala UI"/>
-        <a:font script="Tale" typeface="Microsoft Tai Le"/>
-        <a:font script="Talu" typeface="Microsoft New Tai Lue"/>
-        <a:font script="Tfng" typeface="Ebrima"/>
       </a:majorFont>
       <a:minorFont>
         <a:latin typeface="Calibri" panose="020F0502020204030204"/>
@@ -15629,26 +15502,9 @@
         <a:font script="Viet" typeface="Arial"/>
         <a:font script="Uigh" typeface="Microsoft Uighur"/>
         <a:font script="Geor" typeface="Sylfaen"/>
-        <a:font script="Armn" typeface="Arial"/>
-        <a:font script="Bugi" typeface="Leelawadee UI"/>
-        <a:font script="Bopo" typeface="Microsoft JhengHei"/>
-        <a:font script="Java" typeface="Javanese Text"/>
-        <a:font script="Lisu" typeface="Segoe UI"/>
-        <a:font script="Mymr" typeface="Myanmar Text"/>
-        <a:font script="Nkoo" typeface="Ebrima"/>
-        <a:font script="Olck" typeface="Nirmala UI"/>
-        <a:font script="Osma" typeface="Ebrima"/>
-        <a:font script="Phag" typeface="Phagspa"/>
-        <a:font script="Syrn" typeface="Estrangelo Edessa"/>
-        <a:font script="Syrj" typeface="Estrangelo Edessa"/>
-        <a:font script="Syre" typeface="Estrangelo Edessa"/>
-        <a:font script="Sora" typeface="Nirmala UI"/>
-        <a:font script="Tale" typeface="Microsoft Tai Le"/>
-        <a:font script="Talu" typeface="Microsoft New Tai Lue"/>
-        <a:font script="Tfng" typeface="Ebrima"/>
       </a:minorFont>
     </a:fontScheme>
-    <a:fmtScheme name="Office">
+    <a:fmtScheme name="Office Theme">
       <a:fillStyleLst>
         <a:solidFill>
           <a:schemeClr val="phClr"/>
@@ -15790,7 +15646,7 @@
   <a:extraClrSchemeLst/>
   <a:extLst>
     <a:ext uri="{05A4C25C-085E-4340-85A3-A5531E510DB2}">
-      <thm15:themeFamily xmlns:thm15="http://schemas.microsoft.com/office/thememl/2012/main" name="Office Theme" id="{62F939B6-93AF-4DB8-9C6B-D6C7DFDC589F}" vid="{4A3C46E8-61CC-4603-A589-7422A47A8E4A}"/>
+      <thm15:themeFamily xmlns:thm15="http://schemas.microsoft.com/office/thememl/2012/main" name="Office Theme" id="{62F939B6-93AF-4DB8-9C6B-D6C7DFDC589F}" vid="{AE6F2518-B084-4896-AF52-66CC2144AA26}"/>
     </a:ext>
   </a:extLst>
 </a:theme>

</xml_diff>

<commit_message>
Fixed joint limit conversion mistake
</commit_message>
<xml_diff>
--- a/docs/report.pptx
+++ b/docs/report.pptx
@@ -126,7 +126,7 @@
   <pc:docChgLst>
     <pc:chgData name="Mansur He" userId="2cd3e99d6a3c3959" providerId="LiveId" clId="{16CB9BD3-0FD0-435F-BA63-C692E6031789}"/>
     <pc:docChg chg="undo redo custSel addSld delSld modSld sldOrd modMainMaster">
-      <pc:chgData name="Mansur He" userId="2cd3e99d6a3c3959" providerId="LiveId" clId="{16CB9BD3-0FD0-435F-BA63-C692E6031789}" dt="2017-11-17T18:00:36.767" v="4879" actId="1035"/>
+      <pc:chgData name="Mansur He" userId="2cd3e99d6a3c3959" providerId="LiveId" clId="{16CB9BD3-0FD0-435F-BA63-C692E6031789}" dt="2017-11-17T21:05:55.637" v="4904" actId="1076"/>
       <pc:docMkLst>
         <pc:docMk/>
       </pc:docMkLst>
@@ -567,7 +567,7 @@
         </pc:cxnChg>
       </pc:sldChg>
       <pc:sldChg chg="addSp delSp modSp">
-        <pc:chgData name="Mansur He" userId="2cd3e99d6a3c3959" providerId="LiveId" clId="{16CB9BD3-0FD0-435F-BA63-C692E6031789}" dt="2017-11-15T19:25:23.304" v="1730" actId="20577"/>
+        <pc:chgData name="Mansur He" userId="2cd3e99d6a3c3959" providerId="LiveId" clId="{16CB9BD3-0FD0-435F-BA63-C692E6031789}" dt="2017-11-17T21:05:55.637" v="4904" actId="1076"/>
         <pc:sldMkLst>
           <pc:docMk/>
           <pc:sldMk cId="2821594686" sldId="261"/>
@@ -588,6 +588,14 @@
             <ac:spMk id="3" creationId="{C13950B7-2D31-4110-92D4-014344DB4B3F}"/>
           </ac:spMkLst>
         </pc:spChg>
+        <pc:spChg chg="mod">
+          <ac:chgData name="Mansur He" userId="2cd3e99d6a3c3959" providerId="LiveId" clId="{16CB9BD3-0FD0-435F-BA63-C692E6031789}" dt="2017-11-17T21:05:55.637" v="4904" actId="1076"/>
+          <ac:spMkLst>
+            <pc:docMk/>
+            <pc:sldMk cId="2821594686" sldId="261"/>
+            <ac:spMk id="5" creationId="{01B75C1B-E27B-45F2-9AE6-6706045192DC}"/>
+          </ac:spMkLst>
+        </pc:spChg>
         <pc:spChg chg="add del mod">
           <ac:chgData name="Mansur He" userId="2cd3e99d6a3c3959" providerId="LiveId" clId="{16CB9BD3-0FD0-435F-BA63-C692E6031789}" dt="2017-11-15T19:24:53.394" v="1708" actId="478"/>
           <ac:spMkLst>
@@ -597,13 +605,61 @@
           </ac:spMkLst>
         </pc:spChg>
         <pc:spChg chg="add mod">
-          <ac:chgData name="Mansur He" userId="2cd3e99d6a3c3959" providerId="LiveId" clId="{16CB9BD3-0FD0-435F-BA63-C692E6031789}" dt="2017-11-15T19:25:23.304" v="1730" actId="20577"/>
+          <ac:chgData name="Mansur He" userId="2cd3e99d6a3c3959" providerId="LiveId" clId="{16CB9BD3-0FD0-435F-BA63-C692E6031789}" dt="2017-11-17T21:05:48.045" v="4902" actId="1076"/>
           <ac:spMkLst>
             <pc:docMk/>
             <pc:sldMk cId="2821594686" sldId="261"/>
             <ac:spMk id="6" creationId="{4B16F63E-543A-45CE-B8A4-DA2F5634CCFA}"/>
           </ac:spMkLst>
         </pc:spChg>
+        <pc:spChg chg="mod">
+          <ac:chgData name="Mansur He" userId="2cd3e99d6a3c3959" providerId="LiveId" clId="{16CB9BD3-0FD0-435F-BA63-C692E6031789}" dt="2017-11-17T21:03:58.001" v="4893" actId="1076"/>
+          <ac:spMkLst>
+            <pc:docMk/>
+            <pc:sldMk cId="2821594686" sldId="261"/>
+            <ac:spMk id="8" creationId="{D8155AAD-9962-4CA6-ACC4-F0B27FBC8556}"/>
+          </ac:spMkLst>
+        </pc:spChg>
+        <pc:spChg chg="mod">
+          <ac:chgData name="Mansur He" userId="2cd3e99d6a3c3959" providerId="LiveId" clId="{16CB9BD3-0FD0-435F-BA63-C692E6031789}" dt="2017-11-17T21:04:08.645" v="4895" actId="1076"/>
+          <ac:spMkLst>
+            <pc:docMk/>
+            <pc:sldMk cId="2821594686" sldId="261"/>
+            <ac:spMk id="9" creationId="{55A22FEF-B129-4417-8A4C-F657E472FF17}"/>
+          </ac:spMkLst>
+        </pc:spChg>
+        <pc:spChg chg="mod">
+          <ac:chgData name="Mansur He" userId="2cd3e99d6a3c3959" providerId="LiveId" clId="{16CB9BD3-0FD0-435F-BA63-C692E6031789}" dt="2017-11-17T21:04:31.730" v="4898" actId="1076"/>
+          <ac:spMkLst>
+            <pc:docMk/>
+            <pc:sldMk cId="2821594686" sldId="261"/>
+            <ac:spMk id="10" creationId="{B384EE35-9580-4293-ADE6-638BA1C467C5}"/>
+          </ac:spMkLst>
+        </pc:spChg>
+        <pc:picChg chg="add mod">
+          <ac:chgData name="Mansur He" userId="2cd3e99d6a3c3959" providerId="LiveId" clId="{16CB9BD3-0FD0-435F-BA63-C692E6031789}" dt="2017-11-17T21:03:46.961" v="4891" actId="1076"/>
+          <ac:picMkLst>
+            <pc:docMk/>
+            <pc:sldMk cId="2821594686" sldId="261"/>
+            <ac:picMk id="11" creationId="{19E6C715-AB73-49B8-BA17-1E2F1337181D}"/>
+          </ac:picMkLst>
+        </pc:picChg>
+        <pc:picChg chg="mod">
+          <ac:chgData name="Mansur He" userId="2cd3e99d6a3c3959" providerId="LiveId" clId="{16CB9BD3-0FD0-435F-BA63-C692E6031789}" dt="2017-11-17T21:03:36.922" v="4887" actId="1076"/>
+          <ac:picMkLst>
+            <pc:docMk/>
+            <pc:sldMk cId="2821594686" sldId="261"/>
+            <ac:picMk id="36" creationId="{16E6F12A-BDEA-4947-8182-5C4E9409BDEA}"/>
+          </ac:picMkLst>
+        </pc:picChg>
+        <pc:picChg chg="del">
+          <ac:chgData name="Mansur He" userId="2cd3e99d6a3c3959" providerId="LiveId" clId="{16CB9BD3-0FD0-435F-BA63-C692E6031789}" dt="2017-11-17T21:03:39.641" v="4888" actId="478"/>
+          <ac:picMkLst>
+            <pc:docMk/>
+            <pc:sldMk cId="2821594686" sldId="261"/>
+            <ac:picMk id="38" creationId="{48E93331-9B9E-4B5A-8081-5441C8B1CBBA}"/>
+          </ac:picMkLst>
+        </pc:picChg>
       </pc:sldChg>
       <pc:sldChg chg="del">
         <pc:chgData name="Mansur He" userId="2cd3e99d6a3c3959" providerId="LiveId" clId="{16CB9BD3-0FD0-435F-BA63-C692E6031789}" dt="2017-11-17T12:00:45.923" v="4802" actId="2696"/>
@@ -698,20 +754,20 @@
             <ac:spMk id="22" creationId="{05223A8E-C481-4393-ADCD-21EF16FA6C75}"/>
           </ac:spMkLst>
         </pc:spChg>
+        <pc:spChg chg="add del mod">
+          <ac:chgData name="Mansur He" userId="2cd3e99d6a3c3959" providerId="LiveId" clId="{16CB9BD3-0FD0-435F-BA63-C692E6031789}" dt="2017-11-15T18:23:19.769" v="206" actId="478"/>
+          <ac:spMkLst>
+            <pc:docMk/>
+            <pc:sldMk cId="2375096294" sldId="266"/>
+            <ac:spMk id="23" creationId="{E1B79D96-66A7-4CE3-8776-8EBBE2E2B71E}"/>
+          </ac:spMkLst>
+        </pc:spChg>
         <pc:spChg chg="add del mod ord">
           <ac:chgData name="Mansur He" userId="2cd3e99d6a3c3959" providerId="LiveId" clId="{16CB9BD3-0FD0-435F-BA63-C692E6031789}" dt="2017-11-17T09:05:44.992" v="4003" actId="478"/>
           <ac:spMkLst>
             <pc:docMk/>
             <pc:sldMk cId="2375096294" sldId="266"/>
             <ac:spMk id="23" creationId="{DDA844A3-3434-453B-BE67-4D4B8CC06F4E}"/>
-          </ac:spMkLst>
-        </pc:spChg>
-        <pc:spChg chg="add del mod">
-          <ac:chgData name="Mansur He" userId="2cd3e99d6a3c3959" providerId="LiveId" clId="{16CB9BD3-0FD0-435F-BA63-C692E6031789}" dt="2017-11-15T18:23:19.769" v="206" actId="478"/>
-          <ac:spMkLst>
-            <pc:docMk/>
-            <pc:sldMk cId="2375096294" sldId="266"/>
-            <ac:spMk id="23" creationId="{E1B79D96-66A7-4CE3-8776-8EBBE2E2B71E}"/>
           </ac:spMkLst>
         </pc:spChg>
         <pc:spChg chg="add mod">
@@ -858,14 +914,6 @@
             <ac:spMk id="69" creationId="{8B07EDBE-68EB-4D6A-892F-D97DC093912A}"/>
           </ac:spMkLst>
         </pc:spChg>
-        <pc:spChg chg="add del mod">
-          <ac:chgData name="Mansur He" userId="2cd3e99d6a3c3959" providerId="LiveId" clId="{16CB9BD3-0FD0-435F-BA63-C692E6031789}" dt="2017-11-17T09:02:21.722" v="3893" actId="478"/>
-          <ac:spMkLst>
-            <pc:docMk/>
-            <pc:sldMk cId="2375096294" sldId="266"/>
-            <ac:spMk id="70" creationId="{6C05AB66-A0D6-4D58-93D2-BFFA129732BA}"/>
-          </ac:spMkLst>
-        </pc:spChg>
         <pc:spChg chg="add del mod ord">
           <ac:chgData name="Mansur He" userId="2cd3e99d6a3c3959" providerId="LiveId" clId="{16CB9BD3-0FD0-435F-BA63-C692E6031789}" dt="2017-11-15T18:43:04.298" v="464" actId="478"/>
           <ac:spMkLst>
@@ -875,11 +923,11 @@
           </ac:spMkLst>
         </pc:spChg>
         <pc:spChg chg="add del mod">
-          <ac:chgData name="Mansur He" userId="2cd3e99d6a3c3959" providerId="LiveId" clId="{16CB9BD3-0FD0-435F-BA63-C692E6031789}" dt="2017-11-15T18:43:51.189" v="473" actId="478"/>
+          <ac:chgData name="Mansur He" userId="2cd3e99d6a3c3959" providerId="LiveId" clId="{16CB9BD3-0FD0-435F-BA63-C692E6031789}" dt="2017-11-17T09:02:21.722" v="3893" actId="478"/>
           <ac:spMkLst>
             <pc:docMk/>
             <pc:sldMk cId="2375096294" sldId="266"/>
-            <ac:spMk id="71" creationId="{9B594E4B-7D89-4746-B593-427AFE3BCD0B}"/>
+            <ac:spMk id="70" creationId="{6C05AB66-A0D6-4D58-93D2-BFFA129732BA}"/>
           </ac:spMkLst>
         </pc:spChg>
         <pc:spChg chg="add mod ord">
@@ -888,6 +936,14 @@
             <pc:docMk/>
             <pc:sldMk cId="2375096294" sldId="266"/>
             <ac:spMk id="71" creationId="{4545D4EE-449D-42A6-8A4D-8AB2E61019F3}"/>
+          </ac:spMkLst>
+        </pc:spChg>
+        <pc:spChg chg="add del mod">
+          <ac:chgData name="Mansur He" userId="2cd3e99d6a3c3959" providerId="LiveId" clId="{16CB9BD3-0FD0-435F-BA63-C692E6031789}" dt="2017-11-15T18:43:51.189" v="473" actId="478"/>
+          <ac:spMkLst>
+            <pc:docMk/>
+            <pc:sldMk cId="2375096294" sldId="266"/>
+            <ac:spMk id="71" creationId="{9B594E4B-7D89-4746-B593-427AFE3BCD0B}"/>
           </ac:spMkLst>
         </pc:spChg>
         <pc:spChg chg="add del mod">
@@ -1361,20 +1417,20 @@
             <ac:spMk id="2" creationId="{467FBE66-5456-452D-8833-886E791A0CE6}"/>
           </ac:spMkLst>
         </pc:spChg>
+        <pc:spChg chg="del">
+          <ac:chgData name="Mansur He" userId="2cd3e99d6a3c3959" providerId="LiveId" clId="{16CB9BD3-0FD0-435F-BA63-C692E6031789}" dt="2017-11-15T19:18:20.571" v="1384" actId="478"/>
+          <ac:spMkLst>
+            <pc:docMk/>
+            <pc:sldMk cId="1495167305" sldId="267"/>
+            <ac:spMk id="3" creationId="{608E8751-6351-463D-897E-69264E01D14E}"/>
+          </ac:spMkLst>
+        </pc:spChg>
         <pc:spChg chg="add mod">
           <ac:chgData name="Mansur He" userId="2cd3e99d6a3c3959" providerId="LiveId" clId="{16CB9BD3-0FD0-435F-BA63-C692E6031789}" dt="2017-11-17T08:06:52.757" v="2423" actId="2085"/>
           <ac:spMkLst>
             <pc:docMk/>
             <pc:sldMk cId="1495167305" sldId="267"/>
             <ac:spMk id="3" creationId="{C25F7B17-B1C8-4E24-A2BB-20A6330C601E}"/>
-          </ac:spMkLst>
-        </pc:spChg>
-        <pc:spChg chg="del">
-          <ac:chgData name="Mansur He" userId="2cd3e99d6a3c3959" providerId="LiveId" clId="{16CB9BD3-0FD0-435F-BA63-C692E6031789}" dt="2017-11-15T19:18:20.571" v="1384" actId="478"/>
-          <ac:spMkLst>
-            <pc:docMk/>
-            <pc:sldMk cId="1495167305" sldId="267"/>
-            <ac:spMk id="3" creationId="{608E8751-6351-463D-897E-69264E01D14E}"/>
           </ac:spMkLst>
         </pc:spChg>
         <pc:spChg chg="add mod ord">
@@ -1746,8 +1802,47 @@
           </ac:cxnSpMkLst>
         </pc:cxnChg>
       </pc:sldChg>
+      <pc:sldChg chg="modSp">
+        <pc:chgData name="Mansur He" userId="2cd3e99d6a3c3959" providerId="LiveId" clId="{16CB9BD3-0FD0-435F-BA63-C692E6031789}" dt="2017-11-17T21:04:56.196" v="4901" actId="339"/>
+        <pc:sldMkLst>
+          <pc:docMk/>
+          <pc:sldMk cId="270049934" sldId="268"/>
+        </pc:sldMkLst>
+        <pc:grpChg chg="mod">
+          <ac:chgData name="Mansur He" userId="2cd3e99d6a3c3959" providerId="LiveId" clId="{16CB9BD3-0FD0-435F-BA63-C692E6031789}" dt="2017-11-17T21:04:56.196" v="4901" actId="339"/>
+          <ac:grpSpMkLst>
+            <pc:docMk/>
+            <pc:sldMk cId="270049934" sldId="268"/>
+            <ac:grpSpMk id="216" creationId="{E64435FE-A710-4A83-B17A-E004447CFB42}"/>
+          </ac:grpSpMkLst>
+        </pc:grpChg>
+        <pc:grpChg chg="mod">
+          <ac:chgData name="Mansur He" userId="2cd3e99d6a3c3959" providerId="LiveId" clId="{16CB9BD3-0FD0-435F-BA63-C692E6031789}" dt="2017-11-17T21:04:56.196" v="4901" actId="339"/>
+          <ac:grpSpMkLst>
+            <pc:docMk/>
+            <pc:sldMk cId="270049934" sldId="268"/>
+            <ac:grpSpMk id="218" creationId="{D0FE371A-2800-454A-96BA-7DE6D5B7AB7A}"/>
+          </ac:grpSpMkLst>
+        </pc:grpChg>
+        <pc:graphicFrameChg chg="mod">
+          <ac:chgData name="Mansur He" userId="2cd3e99d6a3c3959" providerId="LiveId" clId="{16CB9BD3-0FD0-435F-BA63-C692E6031789}" dt="2017-11-17T21:04:51.404" v="4899" actId="339"/>
+          <ac:graphicFrameMkLst>
+            <pc:docMk/>
+            <pc:sldMk cId="270049934" sldId="268"/>
+            <ac:graphicFrameMk id="46" creationId="{1EFD5E57-A64F-4EF8-9650-D9039D561BC7}"/>
+          </ac:graphicFrameMkLst>
+        </pc:graphicFrameChg>
+        <pc:graphicFrameChg chg="mod">
+          <ac:chgData name="Mansur He" userId="2cd3e99d6a3c3959" providerId="LiveId" clId="{16CB9BD3-0FD0-435F-BA63-C692E6031789}" dt="2017-11-17T21:04:55.099" v="4900" actId="339"/>
+          <ac:graphicFrameMkLst>
+            <pc:docMk/>
+            <pc:sldMk cId="270049934" sldId="268"/>
+            <ac:graphicFrameMk id="165" creationId="{07A565B1-4CE0-441A-91F2-829849112BA9}"/>
+          </ac:graphicFrameMkLst>
+        </pc:graphicFrameChg>
+      </pc:sldChg>
       <pc:sldChg chg="addSp delSp modSp">
-        <pc:chgData name="Mansur He" userId="2cd3e99d6a3c3959" providerId="LiveId" clId="{16CB9BD3-0FD0-435F-BA63-C692E6031789}" dt="2017-11-17T18:00:27.815" v="4864" actId="20577"/>
+        <pc:chgData name="Mansur He" userId="2cd3e99d6a3c3959" providerId="LiveId" clId="{16CB9BD3-0FD0-435F-BA63-C692E6031789}" dt="2017-11-17T21:02:19.209" v="4880" actId="1076"/>
         <pc:sldMkLst>
           <pc:docMk/>
           <pc:sldMk cId="1087011548" sldId="269"/>
@@ -1793,7 +1888,7 @@
           </ac:spMkLst>
         </pc:spChg>
         <pc:spChg chg="mod">
-          <ac:chgData name="Mansur He" userId="2cd3e99d6a3c3959" providerId="LiveId" clId="{16CB9BD3-0FD0-435F-BA63-C692E6031789}" dt="2017-11-17T11:40:05.494" v="4185"/>
+          <ac:chgData name="Mansur He" userId="2cd3e99d6a3c3959" providerId="LiveId" clId="{16CB9BD3-0FD0-435F-BA63-C692E6031789}" dt="2017-11-17T11:40:05.494" v="4185" actId="20577"/>
           <ac:spMkLst>
             <pc:docMk/>
             <pc:sldMk cId="1087011548" sldId="269"/>
@@ -1817,7 +1912,7 @@
           </ac:spMkLst>
         </pc:spChg>
         <pc:spChg chg="add del mod">
-          <ac:chgData name="Mansur He" userId="2cd3e99d6a3c3959" providerId="LiveId" clId="{16CB9BD3-0FD0-435F-BA63-C692E6031789}" dt="2017-11-17T11:41:55.737" v="4206"/>
+          <ac:chgData name="Mansur He" userId="2cd3e99d6a3c3959" providerId="LiveId" clId="{16CB9BD3-0FD0-435F-BA63-C692E6031789}" dt="2017-11-17T11:41:55.737" v="4206" actId="20577"/>
           <ac:spMkLst>
             <pc:docMk/>
             <pc:sldMk cId="1087011548" sldId="269"/>
@@ -1857,7 +1952,7 @@
           </ac:spMkLst>
         </pc:spChg>
         <pc:spChg chg="add mod">
-          <ac:chgData name="Mansur He" userId="2cd3e99d6a3c3959" providerId="LiveId" clId="{16CB9BD3-0FD0-435F-BA63-C692E6031789}" dt="2017-11-17T18:00:27.815" v="4864" actId="20577"/>
+          <ac:chgData name="Mansur He" userId="2cd3e99d6a3c3959" providerId="LiveId" clId="{16CB9BD3-0FD0-435F-BA63-C692E6031789}" dt="2017-11-17T21:02:19.209" v="4880" actId="1076"/>
           <ac:spMkLst>
             <pc:docMk/>
             <pc:sldMk cId="1087011548" sldId="269"/>
@@ -1865,7 +1960,7 @@
           </ac:spMkLst>
         </pc:spChg>
         <pc:spChg chg="add mod">
-          <ac:chgData name="Mansur He" userId="2cd3e99d6a3c3959" providerId="LiveId" clId="{16CB9BD3-0FD0-435F-BA63-C692E6031789}" dt="2017-11-17T11:52:45.812" v="4668"/>
+          <ac:chgData name="Mansur He" userId="2cd3e99d6a3c3959" providerId="LiveId" clId="{16CB9BD3-0FD0-435F-BA63-C692E6031789}" dt="2017-11-17T21:02:19.209" v="4880" actId="1076"/>
           <ac:spMkLst>
             <pc:docMk/>
             <pc:sldMk cId="1087011548" sldId="269"/>
@@ -2024,7 +2119,7 @@
           </ac:picMkLst>
         </pc:picChg>
         <pc:inkChg chg="add del">
-          <ac:chgData name="Mansur He" userId="2cd3e99d6a3c3959" providerId="LiveId" clId="{16CB9BD3-0FD0-435F-BA63-C692E6031789}" dt="2017-11-17T12:04:13.693" v="4805"/>
+          <ac:chgData name="Mansur He" userId="2cd3e99d6a3c3959" providerId="LiveId" clId="{16CB9BD3-0FD0-435F-BA63-C692E6031789}" dt="2017-11-17T12:04:13.693" v="4805" actId="1076"/>
           <ac:inkMkLst>
             <pc:docMk/>
             <pc:sldMk cId="335473643" sldId="270"/>
@@ -2032,7 +2127,7 @@
           </ac:inkMkLst>
         </pc:inkChg>
         <pc:inkChg chg="add del">
-          <ac:chgData name="Mansur He" userId="2cd3e99d6a3c3959" providerId="LiveId" clId="{16CB9BD3-0FD0-435F-BA63-C692E6031789}" dt="2017-11-17T12:04:33.043" v="4810"/>
+          <ac:chgData name="Mansur He" userId="2cd3e99d6a3c3959" providerId="LiveId" clId="{16CB9BD3-0FD0-435F-BA63-C692E6031789}" dt="2017-11-17T12:04:33.043" v="4810" actId="1076"/>
           <ac:inkMkLst>
             <pc:docMk/>
             <pc:sldMk cId="335473643" sldId="270"/>
@@ -2040,7 +2135,7 @@
           </ac:inkMkLst>
         </pc:inkChg>
         <pc:inkChg chg="add del">
-          <ac:chgData name="Mansur He" userId="2cd3e99d6a3c3959" providerId="LiveId" clId="{16CB9BD3-0FD0-435F-BA63-C692E6031789}" dt="2017-11-17T12:04:33.028" v="4809"/>
+          <ac:chgData name="Mansur He" userId="2cd3e99d6a3c3959" providerId="LiveId" clId="{16CB9BD3-0FD0-435F-BA63-C692E6031789}" dt="2017-11-17T12:04:33.028" v="4809" actId="1076"/>
           <ac:inkMkLst>
             <pc:docMk/>
             <pc:sldMk cId="335473643" sldId="270"/>
@@ -2048,7 +2143,7 @@
           </ac:inkMkLst>
         </pc:inkChg>
         <pc:inkChg chg="add del">
-          <ac:chgData name="Mansur He" userId="2cd3e99d6a3c3959" providerId="LiveId" clId="{16CB9BD3-0FD0-435F-BA63-C692E6031789}" dt="2017-11-17T12:04:33.059" v="4811"/>
+          <ac:chgData name="Mansur He" userId="2cd3e99d6a3c3959" providerId="LiveId" clId="{16CB9BD3-0FD0-435F-BA63-C692E6031789}" dt="2017-11-17T12:04:33.059" v="4811" actId="1076"/>
           <ac:inkMkLst>
             <pc:docMk/>
             <pc:sldMk cId="335473643" sldId="270"/>
@@ -2056,7 +2151,7 @@
           </ac:inkMkLst>
         </pc:inkChg>
         <pc:inkChg chg="add del">
-          <ac:chgData name="Mansur He" userId="2cd3e99d6a3c3959" providerId="LiveId" clId="{16CB9BD3-0FD0-435F-BA63-C692E6031789}" dt="2017-11-17T12:04:36.360" v="4813"/>
+          <ac:chgData name="Mansur He" userId="2cd3e99d6a3c3959" providerId="LiveId" clId="{16CB9BD3-0FD0-435F-BA63-C692E6031789}" dt="2017-11-17T12:04:36.360" v="4813" actId="1076"/>
           <ac:inkMkLst>
             <pc:docMk/>
             <pc:sldMk cId="335473643" sldId="270"/>
@@ -2064,7 +2159,7 @@
           </ac:inkMkLst>
         </pc:inkChg>
         <pc:inkChg chg="add del">
-          <ac:chgData name="Mansur He" userId="2cd3e99d6a3c3959" providerId="LiveId" clId="{16CB9BD3-0FD0-435F-BA63-C692E6031789}" dt="2017-11-17T12:04:41.580" v="4816"/>
+          <ac:chgData name="Mansur He" userId="2cd3e99d6a3c3959" providerId="LiveId" clId="{16CB9BD3-0FD0-435F-BA63-C692E6031789}" dt="2017-11-17T12:04:41.580" v="4816" actId="1076"/>
           <ac:inkMkLst>
             <pc:docMk/>
             <pc:sldMk cId="335473643" sldId="270"/>
@@ -2072,7 +2167,7 @@
           </ac:inkMkLst>
         </pc:inkChg>
         <pc:inkChg chg="add del">
-          <ac:chgData name="Mansur He" userId="2cd3e99d6a3c3959" providerId="LiveId" clId="{16CB9BD3-0FD0-435F-BA63-C692E6031789}" dt="2017-11-17T12:04:41.580" v="4816"/>
+          <ac:chgData name="Mansur He" userId="2cd3e99d6a3c3959" providerId="LiveId" clId="{16CB9BD3-0FD0-435F-BA63-C692E6031789}" dt="2017-11-17T12:04:41.580" v="4816" actId="1076"/>
           <ac:inkMkLst>
             <pc:docMk/>
             <pc:sldMk cId="335473643" sldId="270"/>
@@ -2080,7 +2175,7 @@
           </ac:inkMkLst>
         </pc:inkChg>
         <pc:inkChg chg="add del">
-          <ac:chgData name="Mansur He" userId="2cd3e99d6a3c3959" providerId="LiveId" clId="{16CB9BD3-0FD0-435F-BA63-C692E6031789}" dt="2017-11-17T12:04:42.998" v="4818"/>
+          <ac:chgData name="Mansur He" userId="2cd3e99d6a3c3959" providerId="LiveId" clId="{16CB9BD3-0FD0-435F-BA63-C692E6031789}" dt="2017-11-17T12:04:42.998" v="4818" actId="1076"/>
           <ac:inkMkLst>
             <pc:docMk/>
             <pc:sldMk cId="335473643" sldId="270"/>
@@ -2088,7 +2183,7 @@
           </ac:inkMkLst>
         </pc:inkChg>
         <pc:inkChg chg="add del">
-          <ac:chgData name="Mansur He" userId="2cd3e99d6a3c3959" providerId="LiveId" clId="{16CB9BD3-0FD0-435F-BA63-C692E6031789}" dt="2017-11-17T12:04:42.998" v="4818"/>
+          <ac:chgData name="Mansur He" userId="2cd3e99d6a3c3959" providerId="LiveId" clId="{16CB9BD3-0FD0-435F-BA63-C692E6031789}" dt="2017-11-17T12:04:42.998" v="4818" actId="1076"/>
           <ac:inkMkLst>
             <pc:docMk/>
             <pc:sldMk cId="335473643" sldId="270"/>
@@ -2096,7 +2191,7 @@
           </ac:inkMkLst>
         </pc:inkChg>
         <pc:inkChg chg="add del">
-          <ac:chgData name="Mansur He" userId="2cd3e99d6a3c3959" providerId="LiveId" clId="{16CB9BD3-0FD0-435F-BA63-C692E6031789}" dt="2017-11-17T12:04:44.315" v="4820"/>
+          <ac:chgData name="Mansur He" userId="2cd3e99d6a3c3959" providerId="LiveId" clId="{16CB9BD3-0FD0-435F-BA63-C692E6031789}" dt="2017-11-17T12:04:44.315" v="4820" actId="1076"/>
           <ac:inkMkLst>
             <pc:docMk/>
             <pc:sldMk cId="335473643" sldId="270"/>
@@ -2104,7 +2199,7 @@
           </ac:inkMkLst>
         </pc:inkChg>
         <pc:inkChg chg="add del">
-          <ac:chgData name="Mansur He" userId="2cd3e99d6a3c3959" providerId="LiveId" clId="{16CB9BD3-0FD0-435F-BA63-C692E6031789}" dt="2017-11-17T12:04:44.315" v="4820"/>
+          <ac:chgData name="Mansur He" userId="2cd3e99d6a3c3959" providerId="LiveId" clId="{16CB9BD3-0FD0-435F-BA63-C692E6031789}" dt="2017-11-17T12:04:44.315" v="4820" actId="1076"/>
           <ac:inkMkLst>
             <pc:docMk/>
             <pc:sldMk cId="335473643" sldId="270"/>
@@ -2112,7 +2207,7 @@
           </ac:inkMkLst>
         </pc:inkChg>
         <pc:inkChg chg="add del">
-          <ac:chgData name="Mansur He" userId="2cd3e99d6a3c3959" providerId="LiveId" clId="{16CB9BD3-0FD0-435F-BA63-C692E6031789}" dt="2017-11-17T12:04:46.769" v="4823"/>
+          <ac:chgData name="Mansur He" userId="2cd3e99d6a3c3959" providerId="LiveId" clId="{16CB9BD3-0FD0-435F-BA63-C692E6031789}" dt="2017-11-17T12:04:46.769" v="4823" actId="1076"/>
           <ac:inkMkLst>
             <pc:docMk/>
             <pc:sldMk cId="335473643" sldId="270"/>
@@ -2120,7 +2215,7 @@
           </ac:inkMkLst>
         </pc:inkChg>
         <pc:inkChg chg="add del">
-          <ac:chgData name="Mansur He" userId="2cd3e99d6a3c3959" providerId="LiveId" clId="{16CB9BD3-0FD0-435F-BA63-C692E6031789}" dt="2017-11-17T12:04:46.769" v="4823"/>
+          <ac:chgData name="Mansur He" userId="2cd3e99d6a3c3959" providerId="LiveId" clId="{16CB9BD3-0FD0-435F-BA63-C692E6031789}" dt="2017-11-17T12:04:46.769" v="4823" actId="1076"/>
           <ac:inkMkLst>
             <pc:docMk/>
             <pc:sldMk cId="335473643" sldId="270"/>
@@ -2128,7 +2223,7 @@
           </ac:inkMkLst>
         </pc:inkChg>
         <pc:inkChg chg="add del">
-          <ac:chgData name="Mansur He" userId="2cd3e99d6a3c3959" providerId="LiveId" clId="{16CB9BD3-0FD0-435F-BA63-C692E6031789}" dt="2017-11-17T12:04:46.769" v="4823"/>
+          <ac:chgData name="Mansur He" userId="2cd3e99d6a3c3959" providerId="LiveId" clId="{16CB9BD3-0FD0-435F-BA63-C692E6031789}" dt="2017-11-17T12:04:46.769" v="4823" actId="1076"/>
           <ac:inkMkLst>
             <pc:docMk/>
             <pc:sldMk cId="335473643" sldId="270"/>
@@ -2136,7 +2231,7 @@
           </ac:inkMkLst>
         </pc:inkChg>
         <pc:inkChg chg="add del">
-          <ac:chgData name="Mansur He" userId="2cd3e99d6a3c3959" providerId="LiveId" clId="{16CB9BD3-0FD0-435F-BA63-C692E6031789}" dt="2017-11-17T12:04:50.871" v="4825"/>
+          <ac:chgData name="Mansur He" userId="2cd3e99d6a3c3959" providerId="LiveId" clId="{16CB9BD3-0FD0-435F-BA63-C692E6031789}" dt="2017-11-17T12:04:50.871" v="4825" actId="1076"/>
           <ac:inkMkLst>
             <pc:docMk/>
             <pc:sldMk cId="335473643" sldId="270"/>
@@ -2144,7 +2239,7 @@
           </ac:inkMkLst>
         </pc:inkChg>
         <pc:inkChg chg="add del">
-          <ac:chgData name="Mansur He" userId="2cd3e99d6a3c3959" providerId="LiveId" clId="{16CB9BD3-0FD0-435F-BA63-C692E6031789}" dt="2017-11-17T12:04:50.871" v="4825"/>
+          <ac:chgData name="Mansur He" userId="2cd3e99d6a3c3959" providerId="LiveId" clId="{16CB9BD3-0FD0-435F-BA63-C692E6031789}" dt="2017-11-17T12:04:50.871" v="4825" actId="1076"/>
           <ac:inkMkLst>
             <pc:docMk/>
             <pc:sldMk cId="335473643" sldId="270"/>
@@ -2152,7 +2247,7 @@
           </ac:inkMkLst>
         </pc:inkChg>
         <pc:inkChg chg="add del">
-          <ac:chgData name="Mansur He" userId="2cd3e99d6a3c3959" providerId="LiveId" clId="{16CB9BD3-0FD0-435F-BA63-C692E6031789}" dt="2017-11-17T12:04:52.987" v="4827"/>
+          <ac:chgData name="Mansur He" userId="2cd3e99d6a3c3959" providerId="LiveId" clId="{16CB9BD3-0FD0-435F-BA63-C692E6031789}" dt="2017-11-17T12:04:52.987" v="4827" actId="1076"/>
           <ac:inkMkLst>
             <pc:docMk/>
             <pc:sldMk cId="335473643" sldId="270"/>
@@ -2160,7 +2255,7 @@
           </ac:inkMkLst>
         </pc:inkChg>
         <pc:inkChg chg="add del">
-          <ac:chgData name="Mansur He" userId="2cd3e99d6a3c3959" providerId="LiveId" clId="{16CB9BD3-0FD0-435F-BA63-C692E6031789}" dt="2017-11-17T12:04:52.987" v="4827"/>
+          <ac:chgData name="Mansur He" userId="2cd3e99d6a3c3959" providerId="LiveId" clId="{16CB9BD3-0FD0-435F-BA63-C692E6031789}" dt="2017-11-17T12:04:52.987" v="4827" actId="1076"/>
           <ac:inkMkLst>
             <pc:docMk/>
             <pc:sldMk cId="335473643" sldId="270"/>
@@ -2168,7 +2263,7 @@
           </ac:inkMkLst>
         </pc:inkChg>
         <pc:inkChg chg="add del">
-          <ac:chgData name="Mansur He" userId="2cd3e99d6a3c3959" providerId="LiveId" clId="{16CB9BD3-0FD0-435F-BA63-C692E6031789}" dt="2017-11-17T12:04:54.288" v="4830"/>
+          <ac:chgData name="Mansur He" userId="2cd3e99d6a3c3959" providerId="LiveId" clId="{16CB9BD3-0FD0-435F-BA63-C692E6031789}" dt="2017-11-17T12:04:54.288" v="4830" actId="1076"/>
           <ac:inkMkLst>
             <pc:docMk/>
             <pc:sldMk cId="335473643" sldId="270"/>
@@ -2176,7 +2271,7 @@
           </ac:inkMkLst>
         </pc:inkChg>
         <pc:inkChg chg="add del">
-          <ac:chgData name="Mansur He" userId="2cd3e99d6a3c3959" providerId="LiveId" clId="{16CB9BD3-0FD0-435F-BA63-C692E6031789}" dt="2017-11-17T12:04:54.288" v="4830"/>
+          <ac:chgData name="Mansur He" userId="2cd3e99d6a3c3959" providerId="LiveId" clId="{16CB9BD3-0FD0-435F-BA63-C692E6031789}" dt="2017-11-17T12:04:54.288" v="4830" actId="1076"/>
           <ac:inkMkLst>
             <pc:docMk/>
             <pc:sldMk cId="335473643" sldId="270"/>
@@ -2184,7 +2279,7 @@
           </ac:inkMkLst>
         </pc:inkChg>
         <pc:inkChg chg="add del">
-          <ac:chgData name="Mansur He" userId="2cd3e99d6a3c3959" providerId="LiveId" clId="{16CB9BD3-0FD0-435F-BA63-C692E6031789}" dt="2017-11-17T12:04:54.288" v="4830"/>
+          <ac:chgData name="Mansur He" userId="2cd3e99d6a3c3959" providerId="LiveId" clId="{16CB9BD3-0FD0-435F-BA63-C692E6031789}" dt="2017-11-17T12:04:54.288" v="4830" actId="1076"/>
           <ac:inkMkLst>
             <pc:docMk/>
             <pc:sldMk cId="335473643" sldId="270"/>
@@ -2192,7 +2287,7 @@
           </ac:inkMkLst>
         </pc:inkChg>
         <pc:inkChg chg="add del">
-          <ac:chgData name="Mansur He" userId="2cd3e99d6a3c3959" providerId="LiveId" clId="{16CB9BD3-0FD0-435F-BA63-C692E6031789}" dt="2017-11-17T12:05:03.826" v="4832"/>
+          <ac:chgData name="Mansur He" userId="2cd3e99d6a3c3959" providerId="LiveId" clId="{16CB9BD3-0FD0-435F-BA63-C692E6031789}" dt="2017-11-17T12:05:03.826" v="4832" actId="1076"/>
           <ac:inkMkLst>
             <pc:docMk/>
             <pc:sldMk cId="335473643" sldId="270"/>
@@ -2200,7 +2295,7 @@
           </ac:inkMkLst>
         </pc:inkChg>
         <pc:inkChg chg="add del">
-          <ac:chgData name="Mansur He" userId="2cd3e99d6a3c3959" providerId="LiveId" clId="{16CB9BD3-0FD0-435F-BA63-C692E6031789}" dt="2017-11-17T12:05:03.826" v="4832"/>
+          <ac:chgData name="Mansur He" userId="2cd3e99d6a3c3959" providerId="LiveId" clId="{16CB9BD3-0FD0-435F-BA63-C692E6031789}" dt="2017-11-17T12:05:03.826" v="4832" actId="1076"/>
           <ac:inkMkLst>
             <pc:docMk/>
             <pc:sldMk cId="335473643" sldId="270"/>
@@ -2208,7 +2303,7 @@
           </ac:inkMkLst>
         </pc:inkChg>
         <pc:inkChg chg="add del">
-          <ac:chgData name="Mansur He" userId="2cd3e99d6a3c3959" providerId="LiveId" clId="{16CB9BD3-0FD0-435F-BA63-C692E6031789}" dt="2017-11-17T12:05:04.610" v="4834"/>
+          <ac:chgData name="Mansur He" userId="2cd3e99d6a3c3959" providerId="LiveId" clId="{16CB9BD3-0FD0-435F-BA63-C692E6031789}" dt="2017-11-17T12:05:04.610" v="4834" actId="1076"/>
           <ac:inkMkLst>
             <pc:docMk/>
             <pc:sldMk cId="335473643" sldId="270"/>
@@ -2216,7 +2311,7 @@
           </ac:inkMkLst>
         </pc:inkChg>
         <pc:inkChg chg="add del">
-          <ac:chgData name="Mansur He" userId="2cd3e99d6a3c3959" providerId="LiveId" clId="{16CB9BD3-0FD0-435F-BA63-C692E6031789}" dt="2017-11-17T12:05:04.610" v="4834"/>
+          <ac:chgData name="Mansur He" userId="2cd3e99d6a3c3959" providerId="LiveId" clId="{16CB9BD3-0FD0-435F-BA63-C692E6031789}" dt="2017-11-17T12:05:04.610" v="4834" actId="1076"/>
           <ac:inkMkLst>
             <pc:docMk/>
             <pc:sldMk cId="335473643" sldId="270"/>
@@ -2224,7 +2319,7 @@
           </ac:inkMkLst>
         </pc:inkChg>
         <pc:inkChg chg="add del">
-          <ac:chgData name="Mansur He" userId="2cd3e99d6a3c3959" providerId="LiveId" clId="{16CB9BD3-0FD0-435F-BA63-C692E6031789}" dt="2017-11-17T12:05:12.003" v="4836"/>
+          <ac:chgData name="Mansur He" userId="2cd3e99d6a3c3959" providerId="LiveId" clId="{16CB9BD3-0FD0-435F-BA63-C692E6031789}" dt="2017-11-17T12:05:12.003" v="4836" actId="1076"/>
           <ac:inkMkLst>
             <pc:docMk/>
             <pc:sldMk cId="335473643" sldId="270"/>
@@ -2232,7 +2327,7 @@
           </ac:inkMkLst>
         </pc:inkChg>
         <pc:inkChg chg="add del">
-          <ac:chgData name="Mansur He" userId="2cd3e99d6a3c3959" providerId="LiveId" clId="{16CB9BD3-0FD0-435F-BA63-C692E6031789}" dt="2017-11-17T12:05:12.003" v="4836"/>
+          <ac:chgData name="Mansur He" userId="2cd3e99d6a3c3959" providerId="LiveId" clId="{16CB9BD3-0FD0-435F-BA63-C692E6031789}" dt="2017-11-17T12:05:12.003" v="4836" actId="1076"/>
           <ac:inkMkLst>
             <pc:docMk/>
             <pc:sldMk cId="335473643" sldId="270"/>
@@ -2240,7 +2335,7 @@
           </ac:inkMkLst>
         </pc:inkChg>
         <pc:inkChg chg="add del">
-          <ac:chgData name="Mansur He" userId="2cd3e99d6a3c3959" providerId="LiveId" clId="{16CB9BD3-0FD0-435F-BA63-C692E6031789}" dt="2017-11-17T12:05:12.636" v="4838"/>
+          <ac:chgData name="Mansur He" userId="2cd3e99d6a3c3959" providerId="LiveId" clId="{16CB9BD3-0FD0-435F-BA63-C692E6031789}" dt="2017-11-17T12:05:12.636" v="4838" actId="1076"/>
           <ac:inkMkLst>
             <pc:docMk/>
             <pc:sldMk cId="335473643" sldId="270"/>
@@ -2248,7 +2343,7 @@
           </ac:inkMkLst>
         </pc:inkChg>
         <pc:inkChg chg="add del">
-          <ac:chgData name="Mansur He" userId="2cd3e99d6a3c3959" providerId="LiveId" clId="{16CB9BD3-0FD0-435F-BA63-C692E6031789}" dt="2017-11-17T12:05:12.636" v="4838"/>
+          <ac:chgData name="Mansur He" userId="2cd3e99d6a3c3959" providerId="LiveId" clId="{16CB9BD3-0FD0-435F-BA63-C692E6031789}" dt="2017-11-17T12:05:12.636" v="4838" actId="1076"/>
           <ac:inkMkLst>
             <pc:docMk/>
             <pc:sldMk cId="335473643" sldId="270"/>
@@ -2256,7 +2351,7 @@
           </ac:inkMkLst>
         </pc:inkChg>
         <pc:inkChg chg="add del">
-          <ac:chgData name="Mansur He" userId="2cd3e99d6a3c3959" providerId="LiveId" clId="{16CB9BD3-0FD0-435F-BA63-C692E6031789}" dt="2017-11-17T12:05:14.173" v="4840"/>
+          <ac:chgData name="Mansur He" userId="2cd3e99d6a3c3959" providerId="LiveId" clId="{16CB9BD3-0FD0-435F-BA63-C692E6031789}" dt="2017-11-17T12:05:14.173" v="4840" actId="1076"/>
           <ac:inkMkLst>
             <pc:docMk/>
             <pc:sldMk cId="335473643" sldId="270"/>
@@ -2264,7 +2359,7 @@
           </ac:inkMkLst>
         </pc:inkChg>
         <pc:inkChg chg="add del">
-          <ac:chgData name="Mansur He" userId="2cd3e99d6a3c3959" providerId="LiveId" clId="{16CB9BD3-0FD0-435F-BA63-C692E6031789}" dt="2017-11-17T12:05:14.173" v="4840"/>
+          <ac:chgData name="Mansur He" userId="2cd3e99d6a3c3959" providerId="LiveId" clId="{16CB9BD3-0FD0-435F-BA63-C692E6031789}" dt="2017-11-17T12:05:14.173" v="4840" actId="1076"/>
           <ac:inkMkLst>
             <pc:docMk/>
             <pc:sldMk cId="335473643" sldId="270"/>
@@ -2272,7 +2367,7 @@
           </ac:inkMkLst>
         </pc:inkChg>
         <pc:inkChg chg="add del">
-          <ac:chgData name="Mansur He" userId="2cd3e99d6a3c3959" providerId="LiveId" clId="{16CB9BD3-0FD0-435F-BA63-C692E6031789}" dt="2017-11-17T12:05:17.540" v="4842"/>
+          <ac:chgData name="Mansur He" userId="2cd3e99d6a3c3959" providerId="LiveId" clId="{16CB9BD3-0FD0-435F-BA63-C692E6031789}" dt="2017-11-17T12:05:17.540" v="4842" actId="1076"/>
           <ac:inkMkLst>
             <pc:docMk/>
             <pc:sldMk cId="335473643" sldId="270"/>
@@ -2280,7 +2375,7 @@
           </ac:inkMkLst>
         </pc:inkChg>
         <pc:inkChg chg="add del">
-          <ac:chgData name="Mansur He" userId="2cd3e99d6a3c3959" providerId="LiveId" clId="{16CB9BD3-0FD0-435F-BA63-C692E6031789}" dt="2017-11-17T12:05:17.540" v="4842"/>
+          <ac:chgData name="Mansur He" userId="2cd3e99d6a3c3959" providerId="LiveId" clId="{16CB9BD3-0FD0-435F-BA63-C692E6031789}" dt="2017-11-17T12:05:17.540" v="4842" actId="1076"/>
           <ac:inkMkLst>
             <pc:docMk/>
             <pc:sldMk cId="335473643" sldId="270"/>
@@ -2288,7 +2383,7 @@
           </ac:inkMkLst>
         </pc:inkChg>
         <pc:inkChg chg="add del">
-          <ac:chgData name="Mansur He" userId="2cd3e99d6a3c3959" providerId="LiveId" clId="{16CB9BD3-0FD0-435F-BA63-C692E6031789}" dt="2017-11-17T12:05:19.596" v="4844"/>
+          <ac:chgData name="Mansur He" userId="2cd3e99d6a3c3959" providerId="LiveId" clId="{16CB9BD3-0FD0-435F-BA63-C692E6031789}" dt="2017-11-17T12:05:19.596" v="4844" actId="1076"/>
           <ac:inkMkLst>
             <pc:docMk/>
             <pc:sldMk cId="335473643" sldId="270"/>
@@ -2296,7 +2391,7 @@
           </ac:inkMkLst>
         </pc:inkChg>
         <pc:inkChg chg="add del">
-          <ac:chgData name="Mansur He" userId="2cd3e99d6a3c3959" providerId="LiveId" clId="{16CB9BD3-0FD0-435F-BA63-C692E6031789}" dt="2017-11-17T12:05:19.596" v="4844"/>
+          <ac:chgData name="Mansur He" userId="2cd3e99d6a3c3959" providerId="LiveId" clId="{16CB9BD3-0FD0-435F-BA63-C692E6031789}" dt="2017-11-17T12:05:19.596" v="4844" actId="1076"/>
           <ac:inkMkLst>
             <pc:docMk/>
             <pc:sldMk cId="335473643" sldId="270"/>
@@ -2304,7 +2399,7 @@
           </ac:inkMkLst>
         </pc:inkChg>
         <pc:inkChg chg="add del">
-          <ac:chgData name="Mansur He" userId="2cd3e99d6a3c3959" providerId="LiveId" clId="{16CB9BD3-0FD0-435F-BA63-C692E6031789}" dt="2017-11-17T12:05:20.196" v="4846"/>
+          <ac:chgData name="Mansur He" userId="2cd3e99d6a3c3959" providerId="LiveId" clId="{16CB9BD3-0FD0-435F-BA63-C692E6031789}" dt="2017-11-17T12:05:20.196" v="4846" actId="1076"/>
           <ac:inkMkLst>
             <pc:docMk/>
             <pc:sldMk cId="335473643" sldId="270"/>
@@ -2312,7 +2407,7 @@
           </ac:inkMkLst>
         </pc:inkChg>
         <pc:inkChg chg="add del">
-          <ac:chgData name="Mansur He" userId="2cd3e99d6a3c3959" providerId="LiveId" clId="{16CB9BD3-0FD0-435F-BA63-C692E6031789}" dt="2017-11-17T12:05:20.196" v="4846"/>
+          <ac:chgData name="Mansur He" userId="2cd3e99d6a3c3959" providerId="LiveId" clId="{16CB9BD3-0FD0-435F-BA63-C692E6031789}" dt="2017-11-17T12:05:20.196" v="4846" actId="1076"/>
           <ac:inkMkLst>
             <pc:docMk/>
             <pc:sldMk cId="335473643" sldId="270"/>
@@ -2320,7 +2415,7 @@
           </ac:inkMkLst>
         </pc:inkChg>
         <pc:inkChg chg="add del">
-          <ac:chgData name="Mansur He" userId="2cd3e99d6a3c3959" providerId="LiveId" clId="{16CB9BD3-0FD0-435F-BA63-C692E6031789}" dt="2017-11-17T12:05:26.546" v="4848"/>
+          <ac:chgData name="Mansur He" userId="2cd3e99d6a3c3959" providerId="LiveId" clId="{16CB9BD3-0FD0-435F-BA63-C692E6031789}" dt="2017-11-17T12:05:26.546" v="4848" actId="1076"/>
           <ac:inkMkLst>
             <pc:docMk/>
             <pc:sldMk cId="335473643" sldId="270"/>
@@ -2328,7 +2423,7 @@
           </ac:inkMkLst>
         </pc:inkChg>
         <pc:inkChg chg="add del">
-          <ac:chgData name="Mansur He" userId="2cd3e99d6a3c3959" providerId="LiveId" clId="{16CB9BD3-0FD0-435F-BA63-C692E6031789}" dt="2017-11-17T12:05:26.546" v="4848"/>
+          <ac:chgData name="Mansur He" userId="2cd3e99d6a3c3959" providerId="LiveId" clId="{16CB9BD3-0FD0-435F-BA63-C692E6031789}" dt="2017-11-17T12:05:26.546" v="4848" actId="1076"/>
           <ac:inkMkLst>
             <pc:docMk/>
             <pc:sldMk cId="335473643" sldId="270"/>
@@ -2336,7 +2431,7 @@
           </ac:inkMkLst>
         </pc:inkChg>
         <pc:inkChg chg="add del">
-          <ac:chgData name="Mansur He" userId="2cd3e99d6a3c3959" providerId="LiveId" clId="{16CB9BD3-0FD0-435F-BA63-C692E6031789}" dt="2017-11-17T12:05:27.648" v="4850"/>
+          <ac:chgData name="Mansur He" userId="2cd3e99d6a3c3959" providerId="LiveId" clId="{16CB9BD3-0FD0-435F-BA63-C692E6031789}" dt="2017-11-17T12:05:27.648" v="4850" actId="1076"/>
           <ac:inkMkLst>
             <pc:docMk/>
             <pc:sldMk cId="335473643" sldId="270"/>
@@ -2344,7 +2439,7 @@
           </ac:inkMkLst>
         </pc:inkChg>
         <pc:inkChg chg="add del">
-          <ac:chgData name="Mansur He" userId="2cd3e99d6a3c3959" providerId="LiveId" clId="{16CB9BD3-0FD0-435F-BA63-C692E6031789}" dt="2017-11-17T12:05:27.648" v="4850"/>
+          <ac:chgData name="Mansur He" userId="2cd3e99d6a3c3959" providerId="LiveId" clId="{16CB9BD3-0FD0-435F-BA63-C692E6031789}" dt="2017-11-17T12:05:27.648" v="4850" actId="1076"/>
           <ac:inkMkLst>
             <pc:docMk/>
             <pc:sldMk cId="335473643" sldId="270"/>
@@ -2352,7 +2447,7 @@
           </ac:inkMkLst>
         </pc:inkChg>
         <pc:inkChg chg="add del">
-          <ac:chgData name="Mansur He" userId="2cd3e99d6a3c3959" providerId="LiveId" clId="{16CB9BD3-0FD0-435F-BA63-C692E6031789}" dt="2017-11-17T12:05:28.569" v="4852"/>
+          <ac:chgData name="Mansur He" userId="2cd3e99d6a3c3959" providerId="LiveId" clId="{16CB9BD3-0FD0-435F-BA63-C692E6031789}" dt="2017-11-17T12:05:28.569" v="4852" actId="1076"/>
           <ac:inkMkLst>
             <pc:docMk/>
             <pc:sldMk cId="335473643" sldId="270"/>
@@ -2360,7 +2455,7 @@
           </ac:inkMkLst>
         </pc:inkChg>
         <pc:inkChg chg="add del">
-          <ac:chgData name="Mansur He" userId="2cd3e99d6a3c3959" providerId="LiveId" clId="{16CB9BD3-0FD0-435F-BA63-C692E6031789}" dt="2017-11-17T12:05:28.569" v="4852"/>
+          <ac:chgData name="Mansur He" userId="2cd3e99d6a3c3959" providerId="LiveId" clId="{16CB9BD3-0FD0-435F-BA63-C692E6031789}" dt="2017-11-17T12:05:28.569" v="4852" actId="1076"/>
           <ac:inkMkLst>
             <pc:docMk/>
             <pc:sldMk cId="335473643" sldId="270"/>
@@ -2368,7 +2463,7 @@
           </ac:inkMkLst>
         </pc:inkChg>
         <pc:inkChg chg="add del">
-          <ac:chgData name="Mansur He" userId="2cd3e99d6a3c3959" providerId="LiveId" clId="{16CB9BD3-0FD0-435F-BA63-C692E6031789}" dt="2017-11-17T12:05:30.686" v="4854"/>
+          <ac:chgData name="Mansur He" userId="2cd3e99d6a3c3959" providerId="LiveId" clId="{16CB9BD3-0FD0-435F-BA63-C692E6031789}" dt="2017-11-17T12:05:30.686" v="4854" actId="1076"/>
           <ac:inkMkLst>
             <pc:docMk/>
             <pc:sldMk cId="335473643" sldId="270"/>
@@ -2376,7 +2471,7 @@
           </ac:inkMkLst>
         </pc:inkChg>
         <pc:inkChg chg="add del">
-          <ac:chgData name="Mansur He" userId="2cd3e99d6a3c3959" providerId="LiveId" clId="{16CB9BD3-0FD0-435F-BA63-C692E6031789}" dt="2017-11-17T12:05:30.686" v="4854"/>
+          <ac:chgData name="Mansur He" userId="2cd3e99d6a3c3959" providerId="LiveId" clId="{16CB9BD3-0FD0-435F-BA63-C692E6031789}" dt="2017-11-17T12:05:30.686" v="4854" actId="1076"/>
           <ac:inkMkLst>
             <pc:docMk/>
             <pc:sldMk cId="335473643" sldId="270"/>
@@ -2384,7 +2479,7 @@
           </ac:inkMkLst>
         </pc:inkChg>
         <pc:inkChg chg="add del">
-          <ac:chgData name="Mansur He" userId="2cd3e99d6a3c3959" providerId="LiveId" clId="{16CB9BD3-0FD0-435F-BA63-C692E6031789}" dt="2017-11-17T12:05:31.171" v="4856"/>
+          <ac:chgData name="Mansur He" userId="2cd3e99d6a3c3959" providerId="LiveId" clId="{16CB9BD3-0FD0-435F-BA63-C692E6031789}" dt="2017-11-17T12:05:31.171" v="4856" actId="1076"/>
           <ac:inkMkLst>
             <pc:docMk/>
             <pc:sldMk cId="335473643" sldId="270"/>
@@ -2392,7 +2487,7 @@
           </ac:inkMkLst>
         </pc:inkChg>
         <pc:inkChg chg="add del">
-          <ac:chgData name="Mansur He" userId="2cd3e99d6a3c3959" providerId="LiveId" clId="{16CB9BD3-0FD0-435F-BA63-C692E6031789}" dt="2017-11-17T12:05:31.171" v="4856"/>
+          <ac:chgData name="Mansur He" userId="2cd3e99d6a3c3959" providerId="LiveId" clId="{16CB9BD3-0FD0-435F-BA63-C692E6031789}" dt="2017-11-17T12:05:31.171" v="4856" actId="1076"/>
           <ac:inkMkLst>
             <pc:docMk/>
             <pc:sldMk cId="335473643" sldId="270"/>
@@ -2553,8 +2648,8 @@
   <inkml:trace contextRef="#ctx0" brushRef="#br0" timeOffset="868.9457">171 2614 4864,'0'0'0,"0"0"256,0 0 0,0 0 768,0 0 128,0 0-768,0 0 128,-24 0-256,24 24 128,0 25-256,24 24 128,1 25 256,-1-25 128,1 49-512,-1 1 128,25 23 0,0-24 0,0 0-128,0-48 0,-25-1 0,1-24 0,-25-25-128,24 1 0,-24-1 256,0-24 0,0 0-256,0 0 0,0 0 0,0 0 128,0 0-128,0 0 128,0-24-128,0 24 0,0-25 0,-24 1 0,24-1-256,0 1 0,-25 0 0,25-1 0,0 25-640,0-24 0,0-1-1536,0 25 128,0-24-640</inkml:trace>
   <inkml:trace contextRef="#ctx0" brushRef="#br0" timeOffset="2286.8149">0 2638 4992,'25'0'0,"24"25"128,-49-25 0,0 0 640,0 0 128,0 0 0,0 24 128,24-24-640,1 0 128,-1 25-128,0-25 0,25 0-256,0 0 128,0 0-256,0 0 0,24 0 0,-24 0 0,0 0 0,0-25 0,0 25 0,-25 0 0,25-24 128,-25 24 128,1 0-384,-1-25 128,1 25 0,-1 0 0,-24 0 128,0 0 0,24 0-128,-24 0 0,0 0 0,0 0 0,0 0 0,0 0 128,0 0-128,0 0 0,0 0-128,0 0 128,25 0 0,-25 0 128,0 0-128,0 0 0,0 0 0,0 0 128,0 0-128,0 0 0,0 0 0,0 0 0,0 0-128,0 0 128,24 0 0,-24 0 0,0 0 0,0 0 128,25 0-128,-25 0 0,0 0 0,0 0 0,0 0 0,0 0 128,0 0-128,0 0 0,0 0 0,0 0 128,0 0-128,0 0 0,0 0-128,0 25 128,-25-25 0,1 24 128,-1 25-128,1 0 0,0 0 128,-1 24 0,1 0 0,-1 25 128,1 24-256,-1 0 128,1 49-128,0-49 0,-1 0 0,25-24 0,0-25 128,0-24 0,0-49-128,0 25 128,0-25-128,0 0 0,25-25 0,-25-24 128,0 25-512,24-1 0,-24-23-3328,0-1 0,0 0 1280</inkml:trace>
   <inkml:trace contextRef="#ctx0" brushRef="#br0" timeOffset="3603.6092">490 2907 1792,'-25'0'0,"-24"0"128,25 0 128,-1 0 128,1-24 0,-1 24 256,25 0 0,25-25-128,-25 25 0,24-24 128,1 24 0,-1-25-384,1 1 128,-1-1-256,1 1 0,24 0 0,-25 24 0,1-25 0,-1 25 0,1-24 0,-25 24 128,24 0-128,-24 0 0,25 0 0,-25 0 128,0 0-128,0 0 0,0 0 0,0 0 128,-25 24-128,25-24 0,0 25 0,0-25 128,-24 24-128,24-24 0,0 24-128,-25 1 128,25-1-128,-24 1 128,-1-25 256,25 49 0,-24-25-384,24 0 0,-25 25 0,1-24 0,24 24 128,0-25 0,0-24 0,0 24 0,0-24-128,0 0 128,24 0 0,1-24 128,-25-25-256,24 25 0,1-1 0,-1-24 0,-24 25 0,25 0 0,-25-1 0,0 1 0,0 24 0,0-25 0,0 25 0,0 0 0,0 25 0,0-1 128,-25 25-128,25 0 0,-24 24 0,24 0 0,-25 1 0,1-1 0,24 0 0,-25 1 0,25-1 0,0 0 0,0-24 0,-24 0 0,24 0 0,0-25 0,0 0 0,0-24 0,0 0 0,0 0 0,24 0 0,-24-24 0,25 24 0,-25-24 128,0 24-128,0 0 0,0-25 0,0 25 128,0 0-128,0 0 0,0-24 0,0-1 0,0 25 0,0-24 0,0-1 0,0 1 0,0 0 0,0 24 0,0-25-256,0 1 128,0 24-128,0-25 128,0 1 128,0 0 0,0-1 0,0 1 0,0-1-128,0 25 128,0 0 0,0 0 0,0 0 0,0 25 0,0-1 0,0 25 0,24 0-128,-24 24 128,0-24 0,25 24 0,-25-24-256,0-25 0,0 25-1664,0-49 128,0 25-3072</inkml:trace>
-  <inkml:trace contextRef="#ctx0" brushRef="#br0" timeOffset="23114.1965">452 4531 1024,'0'0'0,"92"0"1536,-92 0 0,-61 0-896,30 0 128,1 0 512,-1 31 0,31-31-1024,0 0 128,0 30 256,31-30 128,-1 0-512,31-30 128,31 30-384,-31-31 0,30 0 0,1 1 0,0-1 0,30 1 128,-31-1 0,1 31 128,-31-30-128,0-1 0,0 31-256,0-30 128,-30 30 0,-31-31 0,30 31-128,-30 0 128,0-30-1280,0 30 128,0 30 128,-30-30 0,30 0-3328</inkml:trace>
-  <inkml:trace contextRef="#ctx0" brushRef="#br0" timeOffset="23899.0335">972 4427 128,'0'0'0,"30"-31"0,-30 31 0,0 0 896,0 0-640,0 0-128,0 0 128,0 0 128,0 0 0,0 31 128,0-31 0,0 0 512,0 0 0,0 0-1024,0 0 128,0 30 128,0-30 128,0 31-256,0 0 128,0 30 128,0 0 0,31 0-256,-31 0 0,30 30 0,1-30 128,-1 0 128,-30 1 0,31-1-384,-31-31 128,0 31 0,0-30 128,0 30-128,0-31 128,-31-30 256,1 31 128,-1-1-384,-30-30 128,31 31 0,-1-31 0,1 0-384,-31 0 128,30 0 0,1 0 0,30 0-128,-31 0 0,31-31-128,0 31 0,0-30-1792,0-1 128,31 1-3840</inkml:trace>
+  <inkml:trace contextRef="#ctx0" brushRef="#br0" timeOffset="23114.1964">452 4531 1024,'0'0'0,"92"0"1536,-92 0 0,-61 0-896,30 0 128,1 0 512,-1 31 0,31-31-1024,0 0 128,0 30 256,31-30 128,-1 0-512,31-30 128,31 30-384,-31-31 0,30 0 0,1 1 0,0-1 0,30 1 128,-31-1 0,1 31 128,-31-30-128,0-1 0,0 31-256,0-30 128,-30 30 0,-31-31 0,30 31-128,-30 0 128,0-30-1280,0 30 128,0 30 128,-30-30 0,30 0-3328</inkml:trace>
+  <inkml:trace contextRef="#ctx0" brushRef="#br0" timeOffset="23899.0334">972 4427 128,'0'0'0,"30"-31"0,-30 31 0,0 0 896,0 0-640,0 0-128,0 0 128,0 0 128,0 0 0,0 31 128,0-31 0,0 0 512,0 0 0,0 0-1024,0 0 128,0 30 128,0-30 128,0 31-256,0 0 128,0 30 128,0 0 0,31 0-256,-31 0 0,30 30 0,1-30 128,-1 0 128,-30 1 0,31-1-384,-31-31 128,0 31 0,0-30 128,0 30-128,0-31 128,-31-30 256,1 31 128,-1-1-384,-30-30 128,31 31 0,-1-31 0,1 0-384,-31 0 128,30 0 0,1 0 0,30 0-128,-31 0 0,31-31-128,0 31 0,0-30-1792,0-1 128,31 1-3840</inkml:trace>
   <inkml:trace contextRef="#ctx0" brushRef="#br1" timeOffset="31291.5942">3639 147 3712,'-24'25'0,"24"-25"0,0 0 128,-25 0 128,25 0 0,0-25 1280,-24 25 0,24-24-1536,-24 24 128,-1 0 256,-24 0 128,25 0-128,-25 0 0,25 0-128,-25 0 0,0 24 128,0 1 0,-24-25-256,0 24 0,-1 0 384,-23 1 0,23 24-384,1 0 0,-25-1 128,1 26 0,-26-1 0,26 0 0,-1 0-256,25 1 128,0-1-128,-1 0 128,25 25-128,1-25 128,-1 1-128,0-1 128,24 0-128,-23-24 128,23 0-128,1 24 128,-1 0-128,1-24 128,-25 0 128,49 0 0,-24 0-256,-1-25 0,25 25 0,-24-25 0,24 1 128,0-1 128,0 1-256,0-25 0,0 24 0,0-24 0,0 0 0,0 0 128,0 25-128,0-25 128,0 0-128,0 0 128,0 0-256,0 0 0,0 0-1792,0 0 0,0 0-5504</inkml:trace>
   <inkml:trace contextRef="#ctx0" brushRef="#br1" timeOffset="31907.3334">1380 1637 896,'31'0'0,"-1"30"384,-30-30 0,0 0 512,0 0 128,0-30-512,0 30 0,0 0 384,0 0 0,0 0-256,0 0 128,0 0-640,0 30 0,-30 1 640,30-1 0,0 31-768,0 0 128,-31 31 0,31 0 0,0-1 128,-30-30 128,-1 31-384,31-1 0,0-30 128,31 0 0,-31 1-128,0-32 128,30 1-128,-30-31 128,0 30-512,0-30 0,0 0-2688,0-30 128,0-1 896</inkml:trace>
   <inkml:trace contextRef="#ctx0" brushRef="#br1" timeOffset="36812.1525">1350 1588 2560,'0'30'0,"30"1"128,-30-31 128,0 0 768,0 0 0,0 30-640,0 1 0,0-1 0,-30 31 128,30 0 128,0 31 0,0-31 0,0 31 0,-31-1-640,62-30 0,-31 31 128,0-1 0,30 1-128,-30-31 0,0 0 0,31 0 128,-31-30-128,0 30 128,0-31-128,0-30 128,0 31 128,0-31 0,0 0-256,0 0 0,0 0 0,0 0 0,0 0 128,0 0 128,0 0-128,0-31 0,0 1 0,0 30 0,-31-31-128,31 1 0,0-1 0,0 31 0,0-30 0,0-1 0,0 1 128,0-1 0,-30 1-256,30-1 128,0 0 0,0-30 0,0 31-128,0-31 128,0 0 0,0 30 0,30-30 0,-30 31 0,0-1 0,0 1 128,0-1-128,31-30 0,-31 30 0,0 1 0,0 30 0,0-31 0,0 1 0,0 30 0,0-31-128,0 1 128,0 30 0,0-31 0,30 31 0,-30 0 0,0 0 0,0 0 128,0 0-128,0 0 0,0 0 0,0 0 128,0 0-128,0 0 0,0 0-128,0 0 128,0 0 0,0 0 0,0 0 0,0 0 0,0 0 0,0 0 0,0 0-128,0 0 128,31 0-128,-1 0 128,1 0 0,-1 0 0,1 0 0,-1 0 128,1 0-256,30 31 128,-30-31 0,-1 0 0,31 0 0,-30 0 0,-31 0 0,30 0 0,1 0 0,-31 0 0,0 0 0,0 0 128,0 0-128,0 0 0,0 0 0,0 0 0,0 0 0,0 0 0,0 0 0,0 0 128,-31 0-128,31 0 0,0 0 0,-30 30 128,-1-30-256,1 31 128,30-1-128,-31-30 128,31 31 0,-30-1 0,30 1 0,-31 0 0,-30-1 0,30 31 0,1 0 128,30 0 0,-31 0-128,1-30 0,-1 30 0,31 0 0,-30-31 128,30 1 0,-31 0-128,31-31 0,0 30 0,0 1 128,-30-31-128,30 0 0,0 30 128,0-30 0,0 0-128,0 0 0,0 0 0,0 0 128,0 0-256,0 0 0,0 0 128,0 0 0,0 0 0,0 0 0,0 0 0,0 0 0,0 0 0,0 0 128,0 0-128,0 0 0,0 0 0,0 0 0,0 0-128,0 0 128,0 0 0,0 0 0,0 0 0,0 0 128,0 0-128,0 0 0,0 31 0,0-31 0,0 0-2688,0 0 0,0 0-1280</inkml:trace>
@@ -2564,7 +2659,7 @@
   <inkml:trace contextRef="#ctx0" brushRef="#br2" timeOffset="46935.439">2718 1014 3712,'0'0'0,"30"0"384,-30 0 0,0 0 384,0 0 0,0 0 0,0-31 128,0 31-512,0 0 0,0-30-128,-30 60 0,30 1 384,0 30 128,0-31-768,-31 32 128,31 29 0,-30-30 128,-1 0-128,31-30 0,-30 30 128,-1 0 0,31-31 0,0 31 0,0-30-128,0 0 128,0-31-256,0 0 128,0 0-128,0 0 128,0 0-128,0 0 128,0-31-128,31 0 128,-1 1-128,-30-1 128,31 1-128,30-1 128,0-30-128,0 31 0,0-1 0,31-30 128,-1 31-128,-30-1 0,31 1 0,-31-1 128,30 1-128,-60-1 0,30 0 0,-30 31 0,-1-30 0,-30 30 0,31 0 0,-31 0 0,0 0 0,0 0 128,0 0-128,0 0 128,0 0-128,0 0 0,0 0 0,-31 0 0,31 0 0,-30 0 0,30 0 0,-31 0 0,31 0 0,-31-31 128,1 31-128,-1-30 128,1 30 0,-1 0 0,-30 0-128,31-31 0,-1 31 0,-30 0 0,31-30 0,-31 30 128,30 0 0,1 0 128,-32 0-128,32 0 0,30 0-128,-31 0 0,31 0 0,0 0 128,-30 0-128,30 0 128,0 0-256,0 0 128,0 0 0,0 0 0,0 0 0,0 0 0,0 0 0,0 0 0,0 0 0,0 0 0,0 0 0,0 0 0,0 0 0,0 0 0,0 0 0,0 0 128,0 0-128,0 0 0,0 0 0,0 0 128,0 0-128,0 0 0,0 0-512,0 0 128,0 0-5632,0 0 0,0 0 6016</inkml:trace>
   <inkml:trace contextRef="#ctx0" brushRef="#br2" timeOffset="47851.6558">2834 1277 2048,'30'-31'0,"1"31"256,-31-30 128,0 30 0,31 0 128,-1-31 0,31 1 128,0 30 0,0-31 0,-30 0-256,30 1 128,0 30-512,-31-31 0,1 1-384,-1 30 128,1 0-3968</inkml:trace>
   <inkml:trace contextRef="#ctx0" brushRef="#br2" timeOffset="49968.4493">4421 807 2176,'0'30'0,"31"1"640,-31-31 0,0 0 384,0 0 128,-31 0-1024,31 30 128,0 31 1408,0 0 128,0 0-1280,0 31 0,31 0-384,-31-1 0,0 1 256,30-31 0,-30 30-128,0-30 0,0 1-128,0-32 128,0 1-256,0-31 0,31 0-2304,-62-31 0,31 31-2560</inkml:trace>
-  <inkml:trace contextRef="#ctx0" brushRef="#br2" timeOffset="50453.0664">4970 861 3968,'0'0'0,"0"30"640,0-30 0,0-30-256,31 30 0,-31-31 0,0 31 0,0 31 1024,-31-1 0,-30 1-1280,31 30 0,-1-31 384,-30 1 128,0 30-256,0-31 128,31 1-384,-1 0 0,0-1 0,1-30 0,30 31-128,0-31 128,30 0-128,1 0 0,0 0 0,-1 0 128,1 0-128,-1 0 0,1 30 0,-1 1 128,1-1 0,-1 31 0,-30-30-128,0-1 128,31 1-128,-1-1 128,1 1-128,-1-1 0,31-30 0,-30 0 128,-1-30-256,1 30 0,0 0-2432,-1-31 128,-30 1-2688</inkml:trace>
+  <inkml:trace contextRef="#ctx0" brushRef="#br2" timeOffset="50453.0663">4970 861 3968,'0'0'0,"0"30"640,0-30 0,0-30-256,31 30 0,-31-31 0,0 31 0,0 31 1024,-31-1 0,-30 1-1280,31 30 0,-1-31 384,-30 1 128,0 30-256,0-31 128,31 1-384,-1 0 0,0-1 0,1-30 0,30 31-128,0-31 128,30 0-128,1 0 0,0 0 0,-1 0 128,1 0-128,-1 0 0,1 30 0,-1 1 128,1-1 0,-1 31 0,-30-30-128,0-1 128,31 1-128,-1-1 128,1 1-128,-1-1 0,31-30 0,-30 0 128,-1-30-256,1 30 0,0 0-2432,-1-31 128,-30 1-2688</inkml:trace>
 </inkml:ink>
 </file>
 
@@ -10696,8 +10791,8 @@
           </a:p>
         </p:txBody>
       </p:sp>
-      <mc:AlternateContent xmlns:mc="http://schemas.openxmlformats.org/markup-compatibility/2006">
-        <mc:Choice xmlns:a14="http://schemas.microsoft.com/office/drawing/2010/main" Requires="a14">
+      <mc:AlternateContent xmlns:mc="http://schemas.openxmlformats.org/markup-compatibility/2006" xmlns:a14="http://schemas.microsoft.com/office/drawing/2010/main">
+        <mc:Choice Requires="a14">
           <p:sp>
             <p:nvSpPr>
               <p:cNvPr id="4" name="TextBox 3">
@@ -10726,6 +10821,7 @@
               </a:bodyPr>
               <a:lstStyle/>
               <a:p>
+                <a:pPr/>
                 <a14:m>
                   <m:oMathPara xmlns:m="http://schemas.openxmlformats.org/officeDocument/2006/math">
                     <m:oMathParaPr>
@@ -10881,7 +10977,7 @@
             </p:txBody>
           </p:sp>
         </mc:Choice>
-        <mc:Fallback>
+        <mc:Fallback xmlns="">
           <p:sp>
             <p:nvSpPr>
               <p:cNvPr id="4" name="TextBox 3">
@@ -10926,8 +11022,8 @@
           </p:sp>
         </mc:Fallback>
       </mc:AlternateContent>
-      <mc:AlternateContent xmlns:mc="http://schemas.openxmlformats.org/markup-compatibility/2006">
-        <mc:Choice xmlns:a14="http://schemas.microsoft.com/office/drawing/2010/main" Requires="a14">
+      <mc:AlternateContent xmlns:mc="http://schemas.openxmlformats.org/markup-compatibility/2006" xmlns:a14="http://schemas.microsoft.com/office/drawing/2010/main">
+        <mc:Choice Requires="a14">
           <p:sp>
             <p:nvSpPr>
               <p:cNvPr id="5" name="TextBox 4">
@@ -10956,6 +11052,7 @@
               </a:bodyPr>
               <a:lstStyle/>
               <a:p>
+                <a:pPr/>
                 <a14:m>
                   <m:oMathPara xmlns:m="http://schemas.openxmlformats.org/officeDocument/2006/math">
                     <m:oMathParaPr>
@@ -11111,7 +11208,7 @@
             </p:txBody>
           </p:sp>
         </mc:Choice>
-        <mc:Fallback>
+        <mc:Fallback xmlns="">
           <p:sp>
             <p:nvSpPr>
               <p:cNvPr id="5" name="TextBox 4">
@@ -11156,8 +11253,8 @@
           </p:sp>
         </mc:Fallback>
       </mc:AlternateContent>
-      <mc:AlternateContent xmlns:mc="http://schemas.openxmlformats.org/markup-compatibility/2006">
-        <mc:Choice xmlns:a14="http://schemas.microsoft.com/office/drawing/2010/main" Requires="a14">
+      <mc:AlternateContent xmlns:mc="http://schemas.openxmlformats.org/markup-compatibility/2006" xmlns:a14="http://schemas.microsoft.com/office/drawing/2010/main">
+        <mc:Choice Requires="a14">
           <p:sp>
             <p:nvSpPr>
               <p:cNvPr id="7" name="TextBox 6">
@@ -11186,6 +11283,7 @@
               </a:bodyPr>
               <a:lstStyle/>
               <a:p>
+                <a:pPr/>
                 <a14:m>
                   <m:oMathPara xmlns:m="http://schemas.openxmlformats.org/officeDocument/2006/math">
                     <m:oMathParaPr>
@@ -11427,7 +11525,7 @@
             </p:txBody>
           </p:sp>
         </mc:Choice>
-        <mc:Fallback>
+        <mc:Fallback xmlns="">
           <p:sp>
             <p:nvSpPr>
               <p:cNvPr id="7" name="TextBox 6">
@@ -11667,8 +11765,8 @@
             </a:prstGeom>
           </p:spPr>
         </p:pic>
-        <mc:AlternateContent xmlns:mc="http://schemas.openxmlformats.org/markup-compatibility/2006">
-          <mc:Choice xmlns:a14="http://schemas.microsoft.com/office/drawing/2010/main" Requires="a14">
+        <mc:AlternateContent xmlns:mc="http://schemas.openxmlformats.org/markup-compatibility/2006" xmlns:a14="http://schemas.microsoft.com/office/drawing/2010/main">
+          <mc:Choice Requires="a14">
             <p:sp>
               <p:nvSpPr>
                 <p:cNvPr id="11" name="Rectangle 10">
@@ -11764,7 +11862,7 @@
               </p:txBody>
             </p:sp>
           </mc:Choice>
-          <mc:Fallback>
+          <mc:Fallback xmlns="">
             <p:sp>
               <p:nvSpPr>
                 <p:cNvPr id="11" name="Rectangle 10">
@@ -11809,8 +11907,8 @@
             </p:sp>
           </mc:Fallback>
         </mc:AlternateContent>
-        <mc:AlternateContent xmlns:mc="http://schemas.openxmlformats.org/markup-compatibility/2006">
-          <mc:Choice xmlns:a14="http://schemas.microsoft.com/office/drawing/2010/main" Requires="a14">
+        <mc:AlternateContent xmlns:mc="http://schemas.openxmlformats.org/markup-compatibility/2006" xmlns:a14="http://schemas.microsoft.com/office/drawing/2010/main">
+          <mc:Choice Requires="a14">
             <p:sp>
               <p:nvSpPr>
                 <p:cNvPr id="12" name="Rectangle 11">
@@ -11906,7 +12004,7 @@
               </p:txBody>
             </p:sp>
           </mc:Choice>
-          <mc:Fallback>
+          <mc:Fallback xmlns="">
             <p:sp>
               <p:nvSpPr>
                 <p:cNvPr id="12" name="Rectangle 11">
@@ -12260,8 +12358,8 @@
           </a:prstGeom>
         </p:spPr>
       </p:pic>
-      <mc:AlternateContent xmlns:mc="http://schemas.openxmlformats.org/markup-compatibility/2006">
-        <mc:Choice xmlns:a14="http://schemas.microsoft.com/office/drawing/2010/main" Requires="a14">
+      <mc:AlternateContent xmlns:mc="http://schemas.openxmlformats.org/markup-compatibility/2006" xmlns:a14="http://schemas.microsoft.com/office/drawing/2010/main">
+        <mc:Choice Requires="a14">
           <p:sp>
             <p:nvSpPr>
               <p:cNvPr id="29" name="TextBox 28">
@@ -12402,7 +12500,7 @@
             </p:txBody>
           </p:sp>
         </mc:Choice>
-        <mc:Fallback>
+        <mc:Fallback xmlns="">
           <p:sp>
             <p:nvSpPr>
               <p:cNvPr id="29" name="TextBox 28">
@@ -12504,7 +12602,7 @@
             </p:nvSpPr>
             <p:spPr>
               <a:xfrm>
-                <a:off x="294510" y="4803409"/>
+                <a:off x="268133" y="5015659"/>
                 <a:ext cx="3411062" cy="526106"/>
               </a:xfrm>
               <a:prstGeom prst="rect">
@@ -12954,7 +13052,7 @@
             </p:nvSpPr>
             <p:spPr>
               <a:xfrm>
-                <a:off x="294510" y="4803409"/>
+                <a:off x="268133" y="5015659"/>
                 <a:ext cx="3411062" cy="526106"/>
               </a:xfrm>
               <a:prstGeom prst="rect">
@@ -12998,7 +13096,7 @@
             </p:nvSpPr>
             <p:spPr>
               <a:xfrm>
-                <a:off x="294510" y="3604652"/>
+                <a:off x="268133" y="3816902"/>
                 <a:ext cx="2443253" cy="1461810"/>
               </a:xfrm>
               <a:prstGeom prst="rect">
@@ -13012,7 +13110,6 @@
               </a:bodyPr>
               <a:lstStyle/>
               <a:p>
-                <a:pPr/>
                 <a:r>
                   <a:rPr lang="en-CA" sz="1400" dirty="0">
                     <a:solidFill>
@@ -13269,6 +13366,7 @@
                 </a:endParaRPr>
               </a:p>
               <a:p>
+                <a:pPr/>
                 <a14:m>
                   <m:oMathPara xmlns:m="http://schemas.openxmlformats.org/officeDocument/2006/math">
                     <m:oMathParaPr>
@@ -13566,7 +13664,6 @@
                 </a:endParaRPr>
               </a:p>
               <a:p>
-                <a:pPr/>
                 <a:endParaRPr lang="en-CA" dirty="0">
                   <a:solidFill>
                     <a:schemeClr val="bg1"/>
@@ -13593,7 +13690,7 @@
             </p:nvSpPr>
             <p:spPr>
               <a:xfrm>
-                <a:off x="294510" y="3604652"/>
+                <a:off x="268133" y="3816902"/>
                 <a:ext cx="2443253" cy="1461810"/>
               </a:xfrm>
               <a:prstGeom prst="rect">
@@ -13602,7 +13699,7 @@
               <a:blipFill>
                 <a:blip r:embed="rId8"/>
                 <a:stretch>
-                  <a:fillRect l="-748" t="-833"/>
+                  <a:fillRect l="-748" t="-1250"/>
                 </a:stretch>
               </a:blipFill>
             </p:spPr>
@@ -13826,7 +13923,7 @@
         </p:nvSpPr>
         <p:spPr>
           <a:xfrm>
-            <a:off x="3676111" y="150470"/>
+            <a:off x="141603" y="150313"/>
             <a:ext cx="4839787" cy="646331"/>
           </a:xfrm>
           <a:prstGeom prst="rect">
@@ -13851,8 +13948,8 @@
           </a:p>
         </p:txBody>
       </p:sp>
-      <mc:AlternateContent xmlns:mc="http://schemas.openxmlformats.org/markup-compatibility/2006" xmlns:a14="http://schemas.microsoft.com/office/drawing/2010/main">
-        <mc:Choice Requires="a14">
+      <mc:AlternateContent xmlns:mc="http://schemas.openxmlformats.org/markup-compatibility/2006">
+        <mc:Choice xmlns:a14="http://schemas.microsoft.com/office/drawing/2010/main" Requires="a14">
           <p:sp>
             <p:nvSpPr>
               <p:cNvPr id="8" name="TextBox 7">
@@ -13867,8 +13964,8 @@
             </p:nvSpPr>
             <p:spPr>
               <a:xfrm>
-                <a:off x="1263656" y="1876676"/>
-                <a:ext cx="1652854" cy="369332"/>
+                <a:off x="3775599" y="2058591"/>
+                <a:ext cx="987743" cy="369332"/>
               </a:xfrm>
               <a:prstGeom prst="rect">
                 <a:avLst/>
@@ -13960,7 +14057,7 @@
             </p:txBody>
           </p:sp>
         </mc:Choice>
-        <mc:Fallback xmlns="">
+        <mc:Fallback>
           <p:sp>
             <p:nvSpPr>
               <p:cNvPr id="8" name="TextBox 7">
@@ -13977,8 +14074,8 @@
             </p:nvSpPr>
             <p:spPr>
               <a:xfrm>
-                <a:off x="1263656" y="1876676"/>
-                <a:ext cx="1652854" cy="369332"/>
+                <a:off x="3775599" y="2058591"/>
+                <a:ext cx="987743" cy="369332"/>
               </a:xfrm>
               <a:prstGeom prst="rect">
                 <a:avLst/>
@@ -14019,7 +14116,7 @@
         </p:nvSpPr>
         <p:spPr>
           <a:xfrm>
-            <a:off x="779210" y="1414462"/>
+            <a:off x="141603" y="984479"/>
             <a:ext cx="5048250" cy="369332"/>
           </a:xfrm>
           <a:prstGeom prst="rect">
@@ -14040,8 +14137,8 @@
           </a:p>
         </p:txBody>
       </p:sp>
-      <mc:AlternateContent xmlns:mc="http://schemas.openxmlformats.org/markup-compatibility/2006" xmlns:a14="http://schemas.microsoft.com/office/drawing/2010/main">
-        <mc:Choice Requires="a14">
+      <mc:AlternateContent xmlns:mc="http://schemas.openxmlformats.org/markup-compatibility/2006">
+        <mc:Choice xmlns:a14="http://schemas.microsoft.com/office/drawing/2010/main" Requires="a14">
           <p:sp>
             <p:nvSpPr>
               <p:cNvPr id="9" name="TextBox 8">
@@ -14056,7 +14153,7 @@
             </p:nvSpPr>
             <p:spPr>
               <a:xfrm>
-                <a:off x="1276362" y="2343397"/>
+                <a:off x="3786137" y="2506929"/>
                 <a:ext cx="1885943" cy="391582"/>
               </a:xfrm>
               <a:prstGeom prst="rect">
@@ -14170,7 +14267,7 @@
             </p:txBody>
           </p:sp>
         </mc:Choice>
-        <mc:Fallback xmlns="">
+        <mc:Fallback>
           <p:sp>
             <p:nvSpPr>
               <p:cNvPr id="9" name="TextBox 8">
@@ -14187,7 +14284,7 @@
             </p:nvSpPr>
             <p:spPr>
               <a:xfrm>
-                <a:off x="1276362" y="2343397"/>
+                <a:off x="3786137" y="2506929"/>
                 <a:ext cx="1885943" cy="391582"/>
               </a:xfrm>
               <a:prstGeom prst="rect">
@@ -14196,7 +14293,7 @@
               <a:blipFill>
                 <a:blip r:embed="rId3"/>
                 <a:stretch>
-                  <a:fillRect b="-7463"/>
+                  <a:fillRect b="-9091"/>
                 </a:stretch>
               </a:blipFill>
             </p:spPr>
@@ -14215,8 +14312,8 @@
           </p:sp>
         </mc:Fallback>
       </mc:AlternateContent>
-      <mc:AlternateContent xmlns:mc="http://schemas.openxmlformats.org/markup-compatibility/2006" xmlns:a14="http://schemas.microsoft.com/office/drawing/2010/main">
-        <mc:Choice Requires="a14">
+      <mc:AlternateContent xmlns:mc="http://schemas.openxmlformats.org/markup-compatibility/2006">
+        <mc:Choice xmlns:a14="http://schemas.microsoft.com/office/drawing/2010/main" Requires="a14">
           <p:sp>
             <p:nvSpPr>
               <p:cNvPr id="10" name="TextBox 9">
@@ -14231,7 +14328,7 @@
             </p:nvSpPr>
             <p:spPr>
               <a:xfrm>
-                <a:off x="1308112" y="2810118"/>
+                <a:off x="5359822" y="3154471"/>
                 <a:ext cx="1652854" cy="623376"/>
               </a:xfrm>
               <a:prstGeom prst="rect">
@@ -14361,7 +14458,14 @@
                               <a:latin typeface="Cambria Math" panose="02040503050406030204" pitchFamily="18" charset="0"/>
                               <a:ea typeface="Cambria Math" panose="02040503050406030204" pitchFamily="18" charset="0"/>
                             </a:rPr>
-                            <m:t>𝐿𝑆</m:t>
+                            <m:t>𝐿</m:t>
+                          </m:r>
+                          <m:r>
+                            <a:rPr lang="en-CA" b="0" i="1" smtClean="0">
+                              <a:latin typeface="Cambria Math" panose="02040503050406030204" pitchFamily="18" charset="0"/>
+                              <a:ea typeface="Cambria Math" panose="02040503050406030204" pitchFamily="18" charset="0"/>
+                            </a:rPr>
+                            <m:t>𝑠</m:t>
                           </m:r>
                           <m:r>
                             <a:rPr lang="en-CA" b="0" i="1" smtClean="0">
@@ -14387,7 +14491,7 @@
             </p:txBody>
           </p:sp>
         </mc:Choice>
-        <mc:Fallback xmlns="">
+        <mc:Fallback>
           <p:sp>
             <p:nvSpPr>
               <p:cNvPr id="10" name="TextBox 9">
@@ -14404,7 +14508,7 @@
             </p:nvSpPr>
             <p:spPr>
               <a:xfrm>
-                <a:off x="1308112" y="2810118"/>
+                <a:off x="5359822" y="3154471"/>
                 <a:ext cx="1652854" cy="623376"/>
               </a:xfrm>
               <a:prstGeom prst="rect">
@@ -14749,8 +14853,8 @@
         </p:blipFill>
         <p:spPr>
           <a:xfrm>
-            <a:off x="4068132" y="4209143"/>
-            <a:ext cx="2968170" cy="1589314"/>
+            <a:off x="4160624" y="4453152"/>
+            <a:ext cx="2674607" cy="1234837"/>
           </a:xfrm>
           <a:prstGeom prst="rect">
             <a:avLst/>
@@ -14766,10 +14870,10 @@
       </p:pic>
       <p:pic>
         <p:nvPicPr>
-          <p:cNvPr id="38" name="Graphic 37">
+          <p:cNvPr id="11" name="Graphic 10">
             <a:extLst>
               <a:ext uri="{FF2B5EF4-FFF2-40B4-BE49-F238E27FC236}">
-                <a16:creationId xmlns:a16="http://schemas.microsoft.com/office/drawing/2014/main" id="{48E93331-9B9E-4B5A-8081-5441C8B1CBBA}"/>
+                <a16:creationId xmlns:a16="http://schemas.microsoft.com/office/drawing/2014/main" id="{19E6C715-AB73-49B8-BA17-1E2F1337181D}"/>
               </a:ext>
             </a:extLst>
           </p:cNvPr>
@@ -14795,8 +14899,8 @@
         </p:blipFill>
         <p:spPr>
           <a:xfrm rot="5400000">
-            <a:off x="8439778" y="1930401"/>
-            <a:ext cx="2968170" cy="1589314"/>
+            <a:off x="8542124" y="2077045"/>
+            <a:ext cx="2674607" cy="1234837"/>
           </a:xfrm>
           <a:prstGeom prst="rect">
             <a:avLst/>
@@ -15454,8 +15558,8 @@
             </a:prstGeom>
           </p:spPr>
         </p:pic>
-        <mc:AlternateContent xmlns:mc="http://schemas.openxmlformats.org/markup-compatibility/2006">
-          <mc:Choice xmlns:p14="http://schemas.microsoft.com/office/powerpoint/2010/main" Requires="p14">
+        <mc:AlternateContent xmlns:mc="http://schemas.openxmlformats.org/markup-compatibility/2006" xmlns:p14="http://schemas.microsoft.com/office/powerpoint/2010/main">
+          <mc:Choice Requires="p14">
             <p:contentPart p14:bwMode="auto" r:id="rId6">
               <p14:nvContentPartPr>
                 <p14:cNvPr id="53" name="Ink 52">
@@ -15474,7 +15578,7 @@
               </p14:xfrm>
             </p:contentPart>
           </mc:Choice>
-          <mc:Fallback>
+          <mc:Fallback xmlns="">
             <p:pic>
               <p:nvPicPr>
                 <p:cNvPr id="53" name="Ink 52">
@@ -16494,8 +16598,8 @@
           </p:sp>
         </mc:Fallback>
       </mc:AlternateContent>
-      <mc:AlternateContent xmlns:mc="http://schemas.openxmlformats.org/markup-compatibility/2006" xmlns:am3d="http://schemas.microsoft.com/office/drawing/2017/model3d">
-        <mc:Choice Requires="am3d">
+      <mc:AlternateContent xmlns:mc="http://schemas.openxmlformats.org/markup-compatibility/2006">
+        <mc:Choice xmlns:am3d="http://schemas.microsoft.com/office/drawing/2017/model3d" Requires="am3d">
           <p:graphicFrame>
             <p:nvGraphicFramePr>
               <p:cNvPr id="46" name="3D Model 45">
@@ -16511,14 +16615,14 @@
               <p:nvPr>
                 <p:extLst>
                   <p:ext uri="{D42A27DB-BD31-4B8C-83A1-F6EECF244321}">
-                    <p14:modId xmlns:p14="http://schemas.microsoft.com/office/powerpoint/2010/main" val="1157042604"/>
+                    <p14:modId xmlns:p14="http://schemas.microsoft.com/office/powerpoint/2010/main" val="2385898841"/>
                   </p:ext>
                 </p:extLst>
               </p:nvPr>
             </p:nvGraphicFramePr>
             <p:xfrm>
-              <a:off x="1604390" y="916621"/>
-              <a:ext cx="3667429" cy="3391042"/>
+              <a:off x="1646917" y="887899"/>
+              <a:ext cx="3582374" cy="3448485"/>
             </p:xfrm>
             <a:graphic>
               <a:graphicData uri="http://schemas.microsoft.com/office/drawing/2017/model3d">
@@ -16526,7 +16630,7 @@
                   <am3d:spPr>
                     <a:xfrm>
                       <a:off x="0" y="0"/>
-                      <a:ext cx="3667429" cy="3391042"/>
+                      <a:ext cx="3582374" cy="3448485"/>
                     </a:xfrm>
                     <a:prstGeom prst="rect">
                       <a:avLst/>
@@ -16546,13 +16650,13 @@
                       <am3d:sy n="1000000" d="1000000"/>
                       <am3d:sz n="1000000" d="1000000"/>
                     </am3d:scale>
-                    <am3d:rot ax="-4271001" ay="349396" az="9805664"/>
+                    <am3d:rot ax="-3811369" ay="437107" az="9943411"/>
                     <am3d:postTrans dx="0" dy="0" dz="0"/>
                   </am3d:trans>
                   <am3d:raster rName="Office3DRenderer" rVer="16.0.8326">
                     <am3d:blip r:embed="rId8"/>
                   </am3d:raster>
-                  <am3d:objViewport viewportSz="4915890"/>
+                  <am3d:objViewport viewportSz="4915889"/>
                   <am3d:ambientLight>
                     <am3d:clr>
                       <a:scrgbClr r="50000" g="50000" b="50000"/>
@@ -16585,7 +16689,7 @@
             </a:graphic>
           </p:graphicFrame>
         </mc:Choice>
-        <mc:Fallback xmlns="">
+        <mc:Fallback>
           <p:pic>
             <p:nvPicPr>
               <p:cNvPr id="46" name="3D Model 45">
@@ -16601,15 +16705,15 @@
               <p:nvPr/>
             </p:nvPicPr>
             <p:blipFill>
-              <a:blip r:embed="rId9"/>
+              <a:blip r:embed="rId8"/>
               <a:stretch>
                 <a:fillRect/>
               </a:stretch>
             </p:blipFill>
             <p:spPr>
               <a:xfrm>
-                <a:off x="1604390" y="916621"/>
-                <a:ext cx="3667429" cy="3391042"/>
+                <a:off x="1646917" y="887899"/>
+                <a:ext cx="3582374" cy="3448485"/>
               </a:xfrm>
               <a:prstGeom prst="rect">
                 <a:avLst/>
@@ -19167,7 +19271,7 @@
                   </p:nvPr>
                 </p:nvGraphicFramePr>
                 <p:xfrm>
-                  <a:off x="7338739" y="4473196"/>
+                  <a:off x="7338740" y="4473197"/>
                   <a:ext cx="2057455" cy="983942"/>
                 </p:xfrm>
                 <a:graphic>

</xml_diff>